<commit_message>
1. PPT changes. 2. Custom Stream code.
</commit_message>
<xml_diff>
--- a/resources/Java 8.pptx
+++ b/resources/Java 8.pptx
@@ -152,7 +152,7 @@
   </p:defaultTextStyle>
   <p:extLst>
     <p:ext uri="{EFAFB233-063F-42B5-8137-9DF3F51BA10A}">
-      <p15:sldGuideLst xmlns="" xmlns:p15="http://schemas.microsoft.com/office/powerpoint/2012/main">
+      <p15:sldGuideLst xmlns:p15="http://schemas.microsoft.com/office/powerpoint/2012/main" xmlns="">
         <p15:guide id="1" orient="horz" pos="2160">
           <p15:clr>
             <a:srgbClr val="A4A3A4"/>
@@ -1385,7 +1385,7 @@
             <a:fld id="{9F18A029-35EC-4FEF-9246-098D854AB476}" type="datetimeFigureOut">
               <a:rPr lang="en-US" smtClean="0"/>
               <a:pPr/>
-              <a:t>28-Jan-18</a:t>
+              <a:t>29-Jan-18</a:t>
             </a:fld>
             <a:endParaRPr lang="en-US"/>
           </a:p>
@@ -1505,7 +1505,7 @@
     </p:spTree>
     <p:extLst>
       <p:ext uri="{BB962C8B-B14F-4D97-AF65-F5344CB8AC3E}">
-        <p14:creationId xmlns="" xmlns:p14="http://schemas.microsoft.com/office/powerpoint/2010/main" val="1194699984"/>
+        <p14:creationId xmlns:p14="http://schemas.microsoft.com/office/powerpoint/2010/main" xmlns="" val="1194699984"/>
       </p:ext>
     </p:extLst>
   </p:cSld>
@@ -1625,7 +1625,7 @@
             <a:fld id="{9F18A029-35EC-4FEF-9246-098D854AB476}" type="datetimeFigureOut">
               <a:rPr lang="en-US" smtClean="0"/>
               <a:pPr/>
-              <a:t>28-Jan-18</a:t>
+              <a:t>29-Jan-18</a:t>
             </a:fld>
             <a:endParaRPr lang="en-US"/>
           </a:p>
@@ -1677,7 +1677,7 @@
     </p:spTree>
     <p:extLst>
       <p:ext uri="{BB962C8B-B14F-4D97-AF65-F5344CB8AC3E}">
-        <p14:creationId xmlns="" xmlns:p14="http://schemas.microsoft.com/office/powerpoint/2010/main" val="3802432313"/>
+        <p14:creationId xmlns:p14="http://schemas.microsoft.com/office/powerpoint/2010/main" xmlns="" val="3802432313"/>
       </p:ext>
     </p:extLst>
   </p:cSld>
@@ -1807,7 +1807,7 @@
             <a:fld id="{9F18A029-35EC-4FEF-9246-098D854AB476}" type="datetimeFigureOut">
               <a:rPr lang="en-US" smtClean="0"/>
               <a:pPr/>
-              <a:t>28-Jan-18</a:t>
+              <a:t>29-Jan-18</a:t>
             </a:fld>
             <a:endParaRPr lang="en-US"/>
           </a:p>
@@ -1859,7 +1859,7 @@
     </p:spTree>
     <p:extLst>
       <p:ext uri="{BB962C8B-B14F-4D97-AF65-F5344CB8AC3E}">
-        <p14:creationId xmlns="" xmlns:p14="http://schemas.microsoft.com/office/powerpoint/2010/main" val="4286666226"/>
+        <p14:creationId xmlns:p14="http://schemas.microsoft.com/office/powerpoint/2010/main" xmlns="" val="4286666226"/>
       </p:ext>
     </p:extLst>
   </p:cSld>
@@ -1979,7 +1979,7 @@
             <a:fld id="{9F18A029-35EC-4FEF-9246-098D854AB476}" type="datetimeFigureOut">
               <a:rPr lang="en-US" smtClean="0"/>
               <a:pPr/>
-              <a:t>28-Jan-18</a:t>
+              <a:t>29-Jan-18</a:t>
             </a:fld>
             <a:endParaRPr lang="en-US"/>
           </a:p>
@@ -2031,7 +2031,7 @@
     </p:spTree>
     <p:extLst>
       <p:ext uri="{BB962C8B-B14F-4D97-AF65-F5344CB8AC3E}">
-        <p14:creationId xmlns="" xmlns:p14="http://schemas.microsoft.com/office/powerpoint/2010/main" val="1667317826"/>
+        <p14:creationId xmlns:p14="http://schemas.microsoft.com/office/powerpoint/2010/main" xmlns="" val="1667317826"/>
       </p:ext>
     </p:extLst>
   </p:cSld>
@@ -2254,7 +2254,7 @@
             <a:fld id="{9F18A029-35EC-4FEF-9246-098D854AB476}" type="datetimeFigureOut">
               <a:rPr lang="en-US" smtClean="0"/>
               <a:pPr/>
-              <a:t>28-Jan-18</a:t>
+              <a:t>29-Jan-18</a:t>
             </a:fld>
             <a:endParaRPr lang="en-US"/>
           </a:p>
@@ -3275,7 +3275,7 @@
     </p:spTree>
     <p:extLst>
       <p:ext uri="{BB962C8B-B14F-4D97-AF65-F5344CB8AC3E}">
-        <p14:creationId xmlns="" xmlns:p14="http://schemas.microsoft.com/office/powerpoint/2010/main" val="2573011766"/>
+        <p14:creationId xmlns:p14="http://schemas.microsoft.com/office/powerpoint/2010/main" xmlns="" val="2573011766"/>
       </p:ext>
     </p:extLst>
   </p:cSld>
@@ -3457,7 +3457,7 @@
             <a:fld id="{9F18A029-35EC-4FEF-9246-098D854AB476}" type="datetimeFigureOut">
               <a:rPr lang="en-US" smtClean="0"/>
               <a:pPr/>
-              <a:t>28-Jan-18</a:t>
+              <a:t>29-Jan-18</a:t>
             </a:fld>
             <a:endParaRPr lang="en-US"/>
           </a:p>
@@ -3509,7 +3509,7 @@
     </p:spTree>
     <p:extLst>
       <p:ext uri="{BB962C8B-B14F-4D97-AF65-F5344CB8AC3E}">
-        <p14:creationId xmlns="" xmlns:p14="http://schemas.microsoft.com/office/powerpoint/2010/main" val="3730748860"/>
+        <p14:creationId xmlns:p14="http://schemas.microsoft.com/office/powerpoint/2010/main" xmlns="" val="3730748860"/>
       </p:ext>
     </p:extLst>
   </p:cSld>
@@ -3518,7 +3518,7 @@
   </p:clrMapOvr>
   <p:extLst mod="1">
     <p:ext uri="{DCECCB84-F9BA-43D5-87BE-67443E8EF086}">
-      <p15:sldGuideLst xmlns="" xmlns:p15="http://schemas.microsoft.com/office/powerpoint/2012/main"/>
+      <p15:sldGuideLst xmlns:p15="http://schemas.microsoft.com/office/powerpoint/2012/main" xmlns=""/>
     </p:ext>
   </p:extLst>
 </p:sldLayout>
@@ -3849,7 +3849,7 @@
             <a:fld id="{9F18A029-35EC-4FEF-9246-098D854AB476}" type="datetimeFigureOut">
               <a:rPr lang="en-US" smtClean="0"/>
               <a:pPr/>
-              <a:t>28-Jan-18</a:t>
+              <a:t>29-Jan-18</a:t>
             </a:fld>
             <a:endParaRPr lang="en-US"/>
           </a:p>
@@ -3901,7 +3901,7 @@
     </p:spTree>
     <p:extLst>
       <p:ext uri="{BB962C8B-B14F-4D97-AF65-F5344CB8AC3E}">
-        <p14:creationId xmlns="" xmlns:p14="http://schemas.microsoft.com/office/powerpoint/2010/main" val="4150457920"/>
+        <p14:creationId xmlns:p14="http://schemas.microsoft.com/office/powerpoint/2010/main" xmlns="" val="4150457920"/>
       </p:ext>
     </p:extLst>
   </p:cSld>
@@ -3910,7 +3910,7 @@
   </p:clrMapOvr>
   <p:extLst mod="1">
     <p:ext uri="{DCECCB84-F9BA-43D5-87BE-67443E8EF086}">
-      <p15:sldGuideLst xmlns="" xmlns:p15="http://schemas.microsoft.com/office/powerpoint/2012/main"/>
+      <p15:sldGuideLst xmlns:p15="http://schemas.microsoft.com/office/powerpoint/2012/main" xmlns=""/>
     </p:ext>
   </p:extLst>
 </p:sldLayout>
@@ -3974,7 +3974,7 @@
             <a:fld id="{9F18A029-35EC-4FEF-9246-098D854AB476}" type="datetimeFigureOut">
               <a:rPr lang="en-US" smtClean="0"/>
               <a:pPr/>
-              <a:t>28-Jan-18</a:t>
+              <a:t>29-Jan-18</a:t>
             </a:fld>
             <a:endParaRPr lang="en-US"/>
           </a:p>
@@ -4026,7 +4026,7 @@
     </p:spTree>
     <p:extLst>
       <p:ext uri="{BB962C8B-B14F-4D97-AF65-F5344CB8AC3E}">
-        <p14:creationId xmlns="" xmlns:p14="http://schemas.microsoft.com/office/powerpoint/2010/main" val="3247931784"/>
+        <p14:creationId xmlns:p14="http://schemas.microsoft.com/office/powerpoint/2010/main" xmlns="" val="3247931784"/>
       </p:ext>
     </p:extLst>
   </p:cSld>
@@ -4071,7 +4071,7 @@
             <a:fld id="{9F18A029-35EC-4FEF-9246-098D854AB476}" type="datetimeFigureOut">
               <a:rPr lang="en-US" smtClean="0"/>
               <a:pPr/>
-              <a:t>28-Jan-18</a:t>
+              <a:t>29-Jan-18</a:t>
             </a:fld>
             <a:endParaRPr lang="en-US"/>
           </a:p>
@@ -4123,7 +4123,7 @@
     </p:spTree>
     <p:extLst>
       <p:ext uri="{BB962C8B-B14F-4D97-AF65-F5344CB8AC3E}">
-        <p14:creationId xmlns="" xmlns:p14="http://schemas.microsoft.com/office/powerpoint/2010/main" val="2155573708"/>
+        <p14:creationId xmlns:p14="http://schemas.microsoft.com/office/powerpoint/2010/main" xmlns="" val="2155573708"/>
       </p:ext>
     </p:extLst>
   </p:cSld>
@@ -4836,7 +4836,7 @@
             <a:fld id="{9F18A029-35EC-4FEF-9246-098D854AB476}" type="datetimeFigureOut">
               <a:rPr lang="en-US" smtClean="0"/>
               <a:pPr/>
-              <a:t>28-Jan-18</a:t>
+              <a:t>29-Jan-18</a:t>
             </a:fld>
             <a:endParaRPr lang="en-US"/>
           </a:p>
@@ -4936,7 +4936,7 @@
     </p:spTree>
     <p:extLst>
       <p:ext uri="{BB962C8B-B14F-4D97-AF65-F5344CB8AC3E}">
-        <p14:creationId xmlns="" xmlns:p14="http://schemas.microsoft.com/office/powerpoint/2010/main" val="3003657932"/>
+        <p14:creationId xmlns:p14="http://schemas.microsoft.com/office/powerpoint/2010/main" xmlns="" val="3003657932"/>
       </p:ext>
     </p:extLst>
   </p:cSld>
@@ -4945,7 +4945,7 @@
   </p:clrMapOvr>
   <p:extLst mod="1">
     <p:ext uri="{DCECCB84-F9BA-43D5-87BE-67443E8EF086}">
-      <p15:sldGuideLst xmlns="" xmlns:p15="http://schemas.microsoft.com/office/powerpoint/2012/main">
+      <p15:sldGuideLst xmlns:p15="http://schemas.microsoft.com/office/powerpoint/2012/main" xmlns="">
         <p15:guide id="1" orient="horz" pos="696">
           <p15:clr>
             <a:srgbClr val="FBAE40"/>
@@ -5678,7 +5678,7 @@
             <a:fld id="{9F18A029-35EC-4FEF-9246-098D854AB476}" type="datetimeFigureOut">
               <a:rPr lang="en-US" smtClean="0"/>
               <a:pPr/>
-              <a:t>28-Jan-18</a:t>
+              <a:t>29-Jan-18</a:t>
             </a:fld>
             <a:endParaRPr lang="en-US"/>
           </a:p>
@@ -5740,7 +5740,7 @@
     </p:spTree>
     <p:extLst>
       <p:ext uri="{BB962C8B-B14F-4D97-AF65-F5344CB8AC3E}">
-        <p14:creationId xmlns="" xmlns:p14="http://schemas.microsoft.com/office/powerpoint/2010/main" val="634818771"/>
+        <p14:creationId xmlns:p14="http://schemas.microsoft.com/office/powerpoint/2010/main" xmlns="" val="634818771"/>
       </p:ext>
     </p:extLst>
   </p:cSld>
@@ -5907,7 +5907,7 @@
             <a:fld id="{9F18A029-35EC-4FEF-9246-098D854AB476}" type="datetimeFigureOut">
               <a:rPr lang="en-US" smtClean="0"/>
               <a:pPr/>
-              <a:t>28-Jan-18</a:t>
+              <a:t>29-Jan-18</a:t>
             </a:fld>
             <a:endParaRPr lang="en-US"/>
           </a:p>
@@ -6499,7 +6499,7 @@
     </p:spTree>
     <p:extLst>
       <p:ext uri="{BB962C8B-B14F-4D97-AF65-F5344CB8AC3E}">
-        <p14:creationId xmlns="" xmlns:p14="http://schemas.microsoft.com/office/powerpoint/2010/main" val="249460068"/>
+        <p14:creationId xmlns:p14="http://schemas.microsoft.com/office/powerpoint/2010/main" xmlns="" val="249460068"/>
       </p:ext>
     </p:extLst>
   </p:cSld>
@@ -6853,7 +6853,7 @@
   </p:txStyles>
   <p:extLst mod="1">
     <p:ext uri="{27BBF7A9-308A-43DC-89C8-2F10F3537804}">
-      <p15:sldGuideLst xmlns="" xmlns:p15="http://schemas.microsoft.com/office/powerpoint/2012/main">
+      <p15:sldGuideLst xmlns:p15="http://schemas.microsoft.com/office/powerpoint/2012/main" xmlns="">
         <p15:guide id="1" pos="792">
           <p15:clr>
             <a:srgbClr val="F26B43"/>
@@ -7011,7 +7011,7 @@
     </p:spTree>
     <p:extLst>
       <p:ext uri="{BB962C8B-B14F-4D97-AF65-F5344CB8AC3E}">
-        <p14:creationId xmlns="" xmlns:p14="http://schemas.microsoft.com/office/powerpoint/2010/main" val="3513107497"/>
+        <p14:creationId xmlns:p14="http://schemas.microsoft.com/office/powerpoint/2010/main" xmlns="" val="3513107497"/>
       </p:ext>
     </p:extLst>
   </p:cSld>
@@ -7242,7 +7242,7 @@
           <p:cNvPr id="4" name="Rectangle 3">
             <a:extLst>
               <a:ext uri="{FF2B5EF4-FFF2-40B4-BE49-F238E27FC236}">
-                <a16:creationId xmlns="" xmlns:a16="http://schemas.microsoft.com/office/drawing/2014/main" id="{DB4BC0FB-75C8-4357-97BE-41FE9008B3E9}"/>
+                <a16:creationId xmlns:a16="http://schemas.microsoft.com/office/drawing/2014/main" xmlns="" id="{DB4BC0FB-75C8-4357-97BE-41FE9008B3E9}"/>
               </a:ext>
             </a:extLst>
           </p:cNvPr>
@@ -7292,7 +7292,7 @@
     </p:spTree>
     <p:extLst>
       <p:ext uri="{BB962C8B-B14F-4D97-AF65-F5344CB8AC3E}">
-        <p14:creationId xmlns="" xmlns:p14="http://schemas.microsoft.com/office/powerpoint/2010/main" val="1327424260"/>
+        <p14:creationId xmlns:p14="http://schemas.microsoft.com/office/powerpoint/2010/main" xmlns="" val="1327424260"/>
       </p:ext>
     </p:extLst>
   </p:cSld>
@@ -7396,7 +7396,7 @@
           <p:cNvPr id="9" name="Title 1">
             <a:extLst>
               <a:ext uri="{FF2B5EF4-FFF2-40B4-BE49-F238E27FC236}">
-                <a16:creationId xmlns="" xmlns:a16="http://schemas.microsoft.com/office/drawing/2014/main" id="{52E13F6F-F007-4F29-BE42-D060E3217C00}"/>
+                <a16:creationId xmlns:a16="http://schemas.microsoft.com/office/drawing/2014/main" xmlns="" id="{52E13F6F-F007-4F29-BE42-D060E3217C00}"/>
               </a:ext>
             </a:extLst>
           </p:cNvPr>
@@ -7429,7 +7429,7 @@
     </p:spTree>
     <p:extLst>
       <p:ext uri="{BB962C8B-B14F-4D97-AF65-F5344CB8AC3E}">
-        <p14:creationId xmlns="" xmlns:p14="http://schemas.microsoft.com/office/powerpoint/2010/main" val="2552697254"/>
+        <p14:creationId xmlns:p14="http://schemas.microsoft.com/office/powerpoint/2010/main" xmlns="" val="2552697254"/>
       </p:ext>
     </p:extLst>
   </p:cSld>
@@ -7993,7 +7993,7 @@
     </p:spTree>
     <p:extLst>
       <p:ext uri="{BB962C8B-B14F-4D97-AF65-F5344CB8AC3E}">
-        <p14:creationId xmlns="" xmlns:p14="http://schemas.microsoft.com/office/powerpoint/2010/main" val="2838219521"/>
+        <p14:creationId xmlns:p14="http://schemas.microsoft.com/office/powerpoint/2010/main" xmlns="" val="2838219521"/>
       </p:ext>
     </p:extLst>
   </p:cSld>
@@ -9697,7 +9697,7 @@
     </p:spTree>
     <p:extLst>
       <p:ext uri="{BB962C8B-B14F-4D97-AF65-F5344CB8AC3E}">
-        <p14:creationId xmlns="" xmlns:p14="http://schemas.microsoft.com/office/powerpoint/2010/main" val="2846528924"/>
+        <p14:creationId xmlns:p14="http://schemas.microsoft.com/office/powerpoint/2010/main" xmlns="" val="2846528924"/>
       </p:ext>
     </p:extLst>
   </p:cSld>
@@ -10781,7 +10781,7 @@
           <p:cNvPr id="2" name="Title 1">
             <a:extLst>
               <a:ext uri="{FF2B5EF4-FFF2-40B4-BE49-F238E27FC236}">
-                <a16:creationId xmlns="" xmlns:a16="http://schemas.microsoft.com/office/drawing/2014/main" id="{2EC7DE58-1CD0-48C0-A939-C21A685DBD08}"/>
+                <a16:creationId xmlns:a16="http://schemas.microsoft.com/office/drawing/2014/main" xmlns="" id="{2EC7DE58-1CD0-48C0-A939-C21A685DBD08}"/>
               </a:ext>
             </a:extLst>
           </p:cNvPr>
@@ -10817,7 +10817,7 @@
           <p:cNvPr id="3" name="Content Placeholder 2">
             <a:extLst>
               <a:ext uri="{FF2B5EF4-FFF2-40B4-BE49-F238E27FC236}">
-                <a16:creationId xmlns="" xmlns:a16="http://schemas.microsoft.com/office/drawing/2014/main" id="{F1A42539-3D9D-473C-BA83-F418310C0909}"/>
+                <a16:creationId xmlns:a16="http://schemas.microsoft.com/office/drawing/2014/main" xmlns="" id="{F1A42539-3D9D-473C-BA83-F418310C0909}"/>
               </a:ext>
             </a:extLst>
           </p:cNvPr>
@@ -11119,7 +11119,7 @@
     </p:spTree>
     <p:extLst>
       <p:ext uri="{BB962C8B-B14F-4D97-AF65-F5344CB8AC3E}">
-        <p14:creationId xmlns="" xmlns:p14="http://schemas.microsoft.com/office/powerpoint/2010/main" val="1626057774"/>
+        <p14:creationId xmlns:p14="http://schemas.microsoft.com/office/powerpoint/2010/main" xmlns="" val="1626057774"/>
       </p:ext>
     </p:extLst>
   </p:cSld>
@@ -11151,7 +11151,7 @@
           <p:cNvPr id="2" name="Title 1">
             <a:extLst>
               <a:ext uri="{FF2B5EF4-FFF2-40B4-BE49-F238E27FC236}">
-                <a16:creationId xmlns="" xmlns:a16="http://schemas.microsoft.com/office/drawing/2014/main" id="{2EC7DE58-1CD0-48C0-A939-C21A685DBD08}"/>
+                <a16:creationId xmlns:a16="http://schemas.microsoft.com/office/drawing/2014/main" xmlns="" id="{2EC7DE58-1CD0-48C0-A939-C21A685DBD08}"/>
               </a:ext>
             </a:extLst>
           </p:cNvPr>
@@ -11187,7 +11187,7 @@
           <p:cNvPr id="3" name="Content Placeholder 2">
             <a:extLst>
               <a:ext uri="{FF2B5EF4-FFF2-40B4-BE49-F238E27FC236}">
-                <a16:creationId xmlns="" xmlns:a16="http://schemas.microsoft.com/office/drawing/2014/main" id="{F1A42539-3D9D-473C-BA83-F418310C0909}"/>
+                <a16:creationId xmlns:a16="http://schemas.microsoft.com/office/drawing/2014/main" xmlns="" id="{F1A42539-3D9D-473C-BA83-F418310C0909}"/>
               </a:ext>
             </a:extLst>
           </p:cNvPr>
@@ -11292,7 +11292,7 @@
           <p:nvPr>
             <p:extLst>
               <p:ext uri="{D42A27DB-BD31-4B8C-83A1-F6EECF244321}">
-                <p14:modId xmlns="" xmlns:p14="http://schemas.microsoft.com/office/powerpoint/2010/main" val="779074116"/>
+                <p14:modId xmlns:p14="http://schemas.microsoft.com/office/powerpoint/2010/main" xmlns="" val="779074116"/>
               </p:ext>
             </p:extLst>
           </p:nvPr>
@@ -11311,28 +11311,28 @@
                 <a:gridCol w="3699545">
                   <a:extLst>
                     <a:ext uri="{9D8B030D-6E8A-4147-A177-3AD203B41FA5}">
-                      <a16:colId xmlns="" xmlns:a16="http://schemas.microsoft.com/office/drawing/2014/main" val="20000"/>
+                      <a16:colId xmlns:a16="http://schemas.microsoft.com/office/drawing/2014/main" xmlns="" val="20000"/>
                     </a:ext>
                   </a:extLst>
                 </a:gridCol>
                 <a:gridCol w="2172748">
                   <a:extLst>
                     <a:ext uri="{9D8B030D-6E8A-4147-A177-3AD203B41FA5}">
-                      <a16:colId xmlns="" xmlns:a16="http://schemas.microsoft.com/office/drawing/2014/main" val="20001"/>
+                      <a16:colId xmlns:a16="http://schemas.microsoft.com/office/drawing/2014/main" xmlns="" val="20001"/>
                     </a:ext>
                   </a:extLst>
                 </a:gridCol>
                 <a:gridCol w="1895912">
                   <a:extLst>
                     <a:ext uri="{9D8B030D-6E8A-4147-A177-3AD203B41FA5}">
-                      <a16:colId xmlns="" xmlns:a16="http://schemas.microsoft.com/office/drawing/2014/main" val="20002"/>
+                      <a16:colId xmlns:a16="http://schemas.microsoft.com/office/drawing/2014/main" xmlns="" val="20002"/>
                     </a:ext>
                   </a:extLst>
                 </a:gridCol>
                 <a:gridCol w="2406622">
                   <a:extLst>
                     <a:ext uri="{9D8B030D-6E8A-4147-A177-3AD203B41FA5}">
-                      <a16:colId xmlns="" xmlns:a16="http://schemas.microsoft.com/office/drawing/2014/main" val="20003"/>
+                      <a16:colId xmlns:a16="http://schemas.microsoft.com/office/drawing/2014/main" xmlns="" val="20003"/>
                     </a:ext>
                   </a:extLst>
                 </a:gridCol>
@@ -11392,7 +11392,7 @@
                 </a:tc>
                 <a:extLst>
                   <a:ext uri="{0D108BD9-81ED-4DB2-BD59-A6C34878D82A}">
-                    <a16:rowId xmlns="" xmlns:a16="http://schemas.microsoft.com/office/drawing/2014/main" val="10000"/>
+                    <a16:rowId xmlns:a16="http://schemas.microsoft.com/office/drawing/2014/main" xmlns="" val="10000"/>
                   </a:ext>
                 </a:extLst>
               </a:tr>
@@ -11451,7 +11451,7 @@
                 </a:tc>
                 <a:extLst>
                   <a:ext uri="{0D108BD9-81ED-4DB2-BD59-A6C34878D82A}">
-                    <a16:rowId xmlns="" xmlns:a16="http://schemas.microsoft.com/office/drawing/2014/main" val="10001"/>
+                    <a16:rowId xmlns:a16="http://schemas.microsoft.com/office/drawing/2014/main" xmlns="" val="10001"/>
                   </a:ext>
                 </a:extLst>
               </a:tr>
@@ -11517,7 +11517,7 @@
                 </a:tc>
                 <a:extLst>
                   <a:ext uri="{0D108BD9-81ED-4DB2-BD59-A6C34878D82A}">
-                    <a16:rowId xmlns="" xmlns:a16="http://schemas.microsoft.com/office/drawing/2014/main" val="10002"/>
+                    <a16:rowId xmlns:a16="http://schemas.microsoft.com/office/drawing/2014/main" xmlns="" val="10002"/>
                   </a:ext>
                 </a:extLst>
               </a:tr>
@@ -11583,7 +11583,7 @@
                 </a:tc>
                 <a:extLst>
                   <a:ext uri="{0D108BD9-81ED-4DB2-BD59-A6C34878D82A}">
-                    <a16:rowId xmlns="" xmlns:a16="http://schemas.microsoft.com/office/drawing/2014/main" val="10003"/>
+                    <a16:rowId xmlns:a16="http://schemas.microsoft.com/office/drawing/2014/main" xmlns="" val="10003"/>
                   </a:ext>
                 </a:extLst>
               </a:tr>
@@ -11642,7 +11642,7 @@
                 </a:tc>
                 <a:extLst>
                   <a:ext uri="{0D108BD9-81ED-4DB2-BD59-A6C34878D82A}">
-                    <a16:rowId xmlns="" xmlns:a16="http://schemas.microsoft.com/office/drawing/2014/main" val="10004"/>
+                    <a16:rowId xmlns:a16="http://schemas.microsoft.com/office/drawing/2014/main" xmlns="" val="10004"/>
                   </a:ext>
                 </a:extLst>
               </a:tr>
@@ -11653,7 +11653,7 @@
     </p:spTree>
     <p:extLst>
       <p:ext uri="{BB962C8B-B14F-4D97-AF65-F5344CB8AC3E}">
-        <p14:creationId xmlns="" xmlns:p14="http://schemas.microsoft.com/office/powerpoint/2010/main" val="1626057774"/>
+        <p14:creationId xmlns:p14="http://schemas.microsoft.com/office/powerpoint/2010/main" xmlns="" val="1626057774"/>
       </p:ext>
     </p:extLst>
   </p:cSld>
@@ -11685,7 +11685,7 @@
           <p:cNvPr id="2" name="Title 1">
             <a:extLst>
               <a:ext uri="{FF2B5EF4-FFF2-40B4-BE49-F238E27FC236}">
-                <a16:creationId xmlns="" xmlns:a16="http://schemas.microsoft.com/office/drawing/2014/main" id="{2EC7DE58-1CD0-48C0-A939-C21A685DBD08}"/>
+                <a16:creationId xmlns:a16="http://schemas.microsoft.com/office/drawing/2014/main" xmlns="" id="{2EC7DE58-1CD0-48C0-A939-C21A685DBD08}"/>
               </a:ext>
             </a:extLst>
           </p:cNvPr>
@@ -11721,7 +11721,7 @@
           <p:cNvPr id="3" name="Content Placeholder 2">
             <a:extLst>
               <a:ext uri="{FF2B5EF4-FFF2-40B4-BE49-F238E27FC236}">
-                <a16:creationId xmlns="" xmlns:a16="http://schemas.microsoft.com/office/drawing/2014/main" id="{F1A42539-3D9D-473C-BA83-F418310C0909}"/>
+                <a16:creationId xmlns:a16="http://schemas.microsoft.com/office/drawing/2014/main" xmlns="" id="{F1A42539-3D9D-473C-BA83-F418310C0909}"/>
               </a:ext>
             </a:extLst>
           </p:cNvPr>
@@ -11962,7 +11962,7 @@
     </p:spTree>
     <p:extLst>
       <p:ext uri="{BB962C8B-B14F-4D97-AF65-F5344CB8AC3E}">
-        <p14:creationId xmlns="" xmlns:p14="http://schemas.microsoft.com/office/powerpoint/2010/main" val="1626057774"/>
+        <p14:creationId xmlns:p14="http://schemas.microsoft.com/office/powerpoint/2010/main" xmlns="" val="1626057774"/>
       </p:ext>
     </p:extLst>
   </p:cSld>
@@ -11994,7 +11994,7 @@
           <p:cNvPr id="3" name="Content Placeholder 2">
             <a:extLst>
               <a:ext uri="{FF2B5EF4-FFF2-40B4-BE49-F238E27FC236}">
-                <a16:creationId xmlns="" xmlns:a16="http://schemas.microsoft.com/office/drawing/2014/main" id="{F19148A9-FA32-41C9-918D-5C232F46CFFD}"/>
+                <a16:creationId xmlns:a16="http://schemas.microsoft.com/office/drawing/2014/main" xmlns="" id="{F19148A9-FA32-41C9-918D-5C232F46CFFD}"/>
               </a:ext>
             </a:extLst>
           </p:cNvPr>
@@ -12033,7 +12033,7 @@
           <p:cNvPr id="4" name="Title 1">
             <a:extLst>
               <a:ext uri="{FF2B5EF4-FFF2-40B4-BE49-F238E27FC236}">
-                <a16:creationId xmlns="" xmlns:a16="http://schemas.microsoft.com/office/drawing/2014/main" id="{AF3F7394-1963-45BF-8E53-9746FE841B45}"/>
+                <a16:creationId xmlns:a16="http://schemas.microsoft.com/office/drawing/2014/main" xmlns="" id="{AF3F7394-1963-45BF-8E53-9746FE841B45}"/>
               </a:ext>
             </a:extLst>
           </p:cNvPr>
@@ -12069,7 +12069,7 @@
           <p:cNvPr id="5" name="Content Placeholder 2">
             <a:extLst>
               <a:ext uri="{FF2B5EF4-FFF2-40B4-BE49-F238E27FC236}">
-                <a16:creationId xmlns="" xmlns:a16="http://schemas.microsoft.com/office/drawing/2014/main" id="{4E7CA4B0-AEDD-498A-8FF6-82F898DAA8C1}"/>
+                <a16:creationId xmlns:a16="http://schemas.microsoft.com/office/drawing/2014/main" xmlns="" id="{4E7CA4B0-AEDD-498A-8FF6-82F898DAA8C1}"/>
               </a:ext>
             </a:extLst>
           </p:cNvPr>
@@ -12737,7 +12737,7 @@
     </p:spTree>
     <p:extLst>
       <p:ext uri="{BB962C8B-B14F-4D97-AF65-F5344CB8AC3E}">
-        <p14:creationId xmlns="" xmlns:p14="http://schemas.microsoft.com/office/powerpoint/2010/main" val="2540538637"/>
+        <p14:creationId xmlns:p14="http://schemas.microsoft.com/office/powerpoint/2010/main" xmlns="" val="2540538637"/>
       </p:ext>
     </p:extLst>
   </p:cSld>
@@ -12769,7 +12769,7 @@
           <p:cNvPr id="2" name="Title 1">
             <a:extLst>
               <a:ext uri="{FF2B5EF4-FFF2-40B4-BE49-F238E27FC236}">
-                <a16:creationId xmlns="" xmlns:a16="http://schemas.microsoft.com/office/drawing/2014/main" id="{2EC7DE58-1CD0-48C0-A939-C21A685DBD08}"/>
+                <a16:creationId xmlns:a16="http://schemas.microsoft.com/office/drawing/2014/main" xmlns="" id="{2EC7DE58-1CD0-48C0-A939-C21A685DBD08}"/>
               </a:ext>
             </a:extLst>
           </p:cNvPr>
@@ -12805,7 +12805,7 @@
           <p:cNvPr id="3" name="Content Placeholder 2">
             <a:extLst>
               <a:ext uri="{FF2B5EF4-FFF2-40B4-BE49-F238E27FC236}">
-                <a16:creationId xmlns="" xmlns:a16="http://schemas.microsoft.com/office/drawing/2014/main" id="{F1A42539-3D9D-473C-BA83-F418310C0909}"/>
+                <a16:creationId xmlns:a16="http://schemas.microsoft.com/office/drawing/2014/main" xmlns="" id="{F1A42539-3D9D-473C-BA83-F418310C0909}"/>
               </a:ext>
             </a:extLst>
           </p:cNvPr>
@@ -13048,7 +13048,7 @@
     </p:spTree>
     <p:extLst>
       <p:ext uri="{BB962C8B-B14F-4D97-AF65-F5344CB8AC3E}">
-        <p14:creationId xmlns="" xmlns:p14="http://schemas.microsoft.com/office/powerpoint/2010/main" val="1626057774"/>
+        <p14:creationId xmlns:p14="http://schemas.microsoft.com/office/powerpoint/2010/main" xmlns="" val="1626057774"/>
       </p:ext>
     </p:extLst>
   </p:cSld>
@@ -13080,7 +13080,7 @@
           <p:cNvPr id="3" name="Content Placeholder 2">
             <a:extLst>
               <a:ext uri="{FF2B5EF4-FFF2-40B4-BE49-F238E27FC236}">
-                <a16:creationId xmlns="" xmlns:a16="http://schemas.microsoft.com/office/drawing/2014/main" id="{CB3E6E7B-0114-4C62-98D3-520F7BEB4376}"/>
+                <a16:creationId xmlns:a16="http://schemas.microsoft.com/office/drawing/2014/main" xmlns="" id="{CB3E6E7B-0114-4C62-98D3-520F7BEB4376}"/>
               </a:ext>
             </a:extLst>
           </p:cNvPr>
@@ -13125,7 +13125,7 @@
           <p:cNvPr id="4" name="Title 1">
             <a:extLst>
               <a:ext uri="{FF2B5EF4-FFF2-40B4-BE49-F238E27FC236}">
-                <a16:creationId xmlns="" xmlns:a16="http://schemas.microsoft.com/office/drawing/2014/main" id="{27C8FDCE-F9EE-47AF-8A28-3DFCBBE72189}"/>
+                <a16:creationId xmlns:a16="http://schemas.microsoft.com/office/drawing/2014/main" xmlns="" id="{27C8FDCE-F9EE-47AF-8A28-3DFCBBE72189}"/>
               </a:ext>
             </a:extLst>
           </p:cNvPr>
@@ -13161,7 +13161,7 @@
           <p:cNvPr id="5" name="Content Placeholder 2">
             <a:extLst>
               <a:ext uri="{FF2B5EF4-FFF2-40B4-BE49-F238E27FC236}">
-                <a16:creationId xmlns="" xmlns:a16="http://schemas.microsoft.com/office/drawing/2014/main" id="{1B1608EB-A950-4521-92C5-CD2F9D844E57}"/>
+                <a16:creationId xmlns:a16="http://schemas.microsoft.com/office/drawing/2014/main" xmlns="" id="{1B1608EB-A950-4521-92C5-CD2F9D844E57}"/>
               </a:ext>
             </a:extLst>
           </p:cNvPr>
@@ -13759,7 +13759,7 @@
     </p:spTree>
     <p:extLst>
       <p:ext uri="{BB962C8B-B14F-4D97-AF65-F5344CB8AC3E}">
-        <p14:creationId xmlns="" xmlns:p14="http://schemas.microsoft.com/office/powerpoint/2010/main" val="996861635"/>
+        <p14:creationId xmlns:p14="http://schemas.microsoft.com/office/powerpoint/2010/main" xmlns="" val="996861635"/>
       </p:ext>
     </p:extLst>
   </p:cSld>
@@ -14821,7 +14821,7 @@
     </p:spTree>
     <p:extLst>
       <p:ext uri="{BB962C8B-B14F-4D97-AF65-F5344CB8AC3E}">
-        <p14:creationId xmlns="" xmlns:p14="http://schemas.microsoft.com/office/powerpoint/2010/main" val="3671730353"/>
+        <p14:creationId xmlns:p14="http://schemas.microsoft.com/office/powerpoint/2010/main" xmlns="" val="3671730353"/>
       </p:ext>
     </p:extLst>
   </p:cSld>
@@ -14853,7 +14853,7 @@
           <p:cNvPr id="2" name="Title 1">
             <a:extLst>
               <a:ext uri="{FF2B5EF4-FFF2-40B4-BE49-F238E27FC236}">
-                <a16:creationId xmlns="" xmlns:a16="http://schemas.microsoft.com/office/drawing/2014/main" id="{2EC7DE58-1CD0-48C0-A939-C21A685DBD08}"/>
+                <a16:creationId xmlns:a16="http://schemas.microsoft.com/office/drawing/2014/main" xmlns="" id="{2EC7DE58-1CD0-48C0-A939-C21A685DBD08}"/>
               </a:ext>
             </a:extLst>
           </p:cNvPr>
@@ -14889,7 +14889,7 @@
           <p:cNvPr id="3" name="Content Placeholder 2">
             <a:extLst>
               <a:ext uri="{FF2B5EF4-FFF2-40B4-BE49-F238E27FC236}">
-                <a16:creationId xmlns="" xmlns:a16="http://schemas.microsoft.com/office/drawing/2014/main" id="{F1A42539-3D9D-473C-BA83-F418310C0909}"/>
+                <a16:creationId xmlns:a16="http://schemas.microsoft.com/office/drawing/2014/main" xmlns="" id="{F1A42539-3D9D-473C-BA83-F418310C0909}"/>
               </a:ext>
             </a:extLst>
           </p:cNvPr>
@@ -15248,7 +15248,7 @@
     </p:spTree>
     <p:extLst>
       <p:ext uri="{BB962C8B-B14F-4D97-AF65-F5344CB8AC3E}">
-        <p14:creationId xmlns="" xmlns:p14="http://schemas.microsoft.com/office/powerpoint/2010/main" val="1626057774"/>
+        <p14:creationId xmlns:p14="http://schemas.microsoft.com/office/powerpoint/2010/main" xmlns="" val="1626057774"/>
       </p:ext>
     </p:extLst>
   </p:cSld>
@@ -15280,7 +15280,7 @@
           <p:cNvPr id="3" name="Content Placeholder 2">
             <a:extLst>
               <a:ext uri="{FF2B5EF4-FFF2-40B4-BE49-F238E27FC236}">
-                <a16:creationId xmlns="" xmlns:a16="http://schemas.microsoft.com/office/drawing/2014/main" id="{41472E7D-FB28-496A-846C-50D3D3C245D5}"/>
+                <a16:creationId xmlns:a16="http://schemas.microsoft.com/office/drawing/2014/main" xmlns="" id="{41472E7D-FB28-496A-846C-50D3D3C245D5}"/>
               </a:ext>
             </a:extLst>
           </p:cNvPr>
@@ -15322,7 +15322,7 @@
           <p:cNvPr id="4" name="Title 1">
             <a:extLst>
               <a:ext uri="{FF2B5EF4-FFF2-40B4-BE49-F238E27FC236}">
-                <a16:creationId xmlns="" xmlns:a16="http://schemas.microsoft.com/office/drawing/2014/main" id="{B6BF131B-43D9-4492-894D-A1409E97BEB7}"/>
+                <a16:creationId xmlns:a16="http://schemas.microsoft.com/office/drawing/2014/main" xmlns="" id="{B6BF131B-43D9-4492-894D-A1409E97BEB7}"/>
               </a:ext>
             </a:extLst>
           </p:cNvPr>
@@ -15358,7 +15358,7 @@
           <p:cNvPr id="5" name="Content Placeholder 2">
             <a:extLst>
               <a:ext uri="{FF2B5EF4-FFF2-40B4-BE49-F238E27FC236}">
-                <a16:creationId xmlns="" xmlns:a16="http://schemas.microsoft.com/office/drawing/2014/main" id="{E7E50A1B-2E0B-4828-BE33-86910ABBBCA5}"/>
+                <a16:creationId xmlns:a16="http://schemas.microsoft.com/office/drawing/2014/main" xmlns="" id="{E7E50A1B-2E0B-4828-BE33-86910ABBBCA5}"/>
               </a:ext>
             </a:extLst>
           </p:cNvPr>
@@ -16022,7 +16022,7 @@
     </p:spTree>
     <p:extLst>
       <p:ext uri="{BB962C8B-B14F-4D97-AF65-F5344CB8AC3E}">
-        <p14:creationId xmlns="" xmlns:p14="http://schemas.microsoft.com/office/powerpoint/2010/main" val="2063926650"/>
+        <p14:creationId xmlns:p14="http://schemas.microsoft.com/office/powerpoint/2010/main" xmlns="" val="2063926650"/>
       </p:ext>
     </p:extLst>
   </p:cSld>
@@ -16054,7 +16054,7 @@
           <p:cNvPr id="2" name="Title 1">
             <a:extLst>
               <a:ext uri="{FF2B5EF4-FFF2-40B4-BE49-F238E27FC236}">
-                <a16:creationId xmlns="" xmlns:a16="http://schemas.microsoft.com/office/drawing/2014/main" id="{2EC7DE58-1CD0-48C0-A939-C21A685DBD08}"/>
+                <a16:creationId xmlns:a16="http://schemas.microsoft.com/office/drawing/2014/main" xmlns="" id="{2EC7DE58-1CD0-48C0-A939-C21A685DBD08}"/>
               </a:ext>
             </a:extLst>
           </p:cNvPr>
@@ -16090,7 +16090,7 @@
           <p:cNvPr id="3" name="Content Placeholder 2">
             <a:extLst>
               <a:ext uri="{FF2B5EF4-FFF2-40B4-BE49-F238E27FC236}">
-                <a16:creationId xmlns="" xmlns:a16="http://schemas.microsoft.com/office/drawing/2014/main" id="{F1A42539-3D9D-473C-BA83-F418310C0909}"/>
+                <a16:creationId xmlns:a16="http://schemas.microsoft.com/office/drawing/2014/main" xmlns="" id="{F1A42539-3D9D-473C-BA83-F418310C0909}"/>
               </a:ext>
             </a:extLst>
           </p:cNvPr>
@@ -16369,7 +16369,7 @@
     </p:spTree>
     <p:extLst>
       <p:ext uri="{BB962C8B-B14F-4D97-AF65-F5344CB8AC3E}">
-        <p14:creationId xmlns="" xmlns:p14="http://schemas.microsoft.com/office/powerpoint/2010/main" val="1626057774"/>
+        <p14:creationId xmlns:p14="http://schemas.microsoft.com/office/powerpoint/2010/main" xmlns="" val="1626057774"/>
       </p:ext>
     </p:extLst>
   </p:cSld>
@@ -16401,7 +16401,7 @@
           <p:cNvPr id="3" name="Content Placeholder 2">
             <a:extLst>
               <a:ext uri="{FF2B5EF4-FFF2-40B4-BE49-F238E27FC236}">
-                <a16:creationId xmlns="" xmlns:a16="http://schemas.microsoft.com/office/drawing/2014/main" id="{7FB6A963-B736-4D02-98DB-07935568DA89}"/>
+                <a16:creationId xmlns:a16="http://schemas.microsoft.com/office/drawing/2014/main" xmlns="" id="{7FB6A963-B736-4D02-98DB-07935568DA89}"/>
               </a:ext>
             </a:extLst>
           </p:cNvPr>
@@ -16440,7 +16440,7 @@
           <p:cNvPr id="4" name="Title 1">
             <a:extLst>
               <a:ext uri="{FF2B5EF4-FFF2-40B4-BE49-F238E27FC236}">
-                <a16:creationId xmlns="" xmlns:a16="http://schemas.microsoft.com/office/drawing/2014/main" id="{52C82903-755D-4468-AB2B-057429ED8FBB}"/>
+                <a16:creationId xmlns:a16="http://schemas.microsoft.com/office/drawing/2014/main" xmlns="" id="{52C82903-755D-4468-AB2B-057429ED8FBB}"/>
               </a:ext>
             </a:extLst>
           </p:cNvPr>
@@ -16476,7 +16476,7 @@
           <p:cNvPr id="5" name="Content Placeholder 2">
             <a:extLst>
               <a:ext uri="{FF2B5EF4-FFF2-40B4-BE49-F238E27FC236}">
-                <a16:creationId xmlns="" xmlns:a16="http://schemas.microsoft.com/office/drawing/2014/main" id="{4652BF3F-B916-48F0-9F06-C69FCBCD52D6}"/>
+                <a16:creationId xmlns:a16="http://schemas.microsoft.com/office/drawing/2014/main" xmlns="" id="{4652BF3F-B916-48F0-9F06-C69FCBCD52D6}"/>
               </a:ext>
             </a:extLst>
           </p:cNvPr>
@@ -17010,7 +17010,7 @@
           <p:cNvPr id="6" name="Content Placeholder 2">
             <a:extLst>
               <a:ext uri="{FF2B5EF4-FFF2-40B4-BE49-F238E27FC236}">
-                <a16:creationId xmlns="" xmlns:a16="http://schemas.microsoft.com/office/drawing/2014/main" id="{5680EFEE-6925-43B7-A5A9-8AB108C48AC6}"/>
+                <a16:creationId xmlns:a16="http://schemas.microsoft.com/office/drawing/2014/main" xmlns="" id="{5680EFEE-6925-43B7-A5A9-8AB108C48AC6}"/>
               </a:ext>
             </a:extLst>
           </p:cNvPr>
@@ -17551,7 +17551,7 @@
     </p:spTree>
     <p:extLst>
       <p:ext uri="{BB962C8B-B14F-4D97-AF65-F5344CB8AC3E}">
-        <p14:creationId xmlns="" xmlns:p14="http://schemas.microsoft.com/office/powerpoint/2010/main" val="807310239"/>
+        <p14:creationId xmlns:p14="http://schemas.microsoft.com/office/powerpoint/2010/main" xmlns="" val="807310239"/>
       </p:ext>
     </p:extLst>
   </p:cSld>
@@ -17583,7 +17583,7 @@
           <p:cNvPr id="2" name="Title 1">
             <a:extLst>
               <a:ext uri="{FF2B5EF4-FFF2-40B4-BE49-F238E27FC236}">
-                <a16:creationId xmlns="" xmlns:a16="http://schemas.microsoft.com/office/drawing/2014/main" id="{2EC7DE58-1CD0-48C0-A939-C21A685DBD08}"/>
+                <a16:creationId xmlns:a16="http://schemas.microsoft.com/office/drawing/2014/main" xmlns="" id="{2EC7DE58-1CD0-48C0-A939-C21A685DBD08}"/>
               </a:ext>
             </a:extLst>
           </p:cNvPr>
@@ -17619,7 +17619,7 @@
           <p:cNvPr id="6" name="Content Placeholder 5">
             <a:extLst>
               <a:ext uri="{FF2B5EF4-FFF2-40B4-BE49-F238E27FC236}">
-                <a16:creationId xmlns="" xmlns:a16="http://schemas.microsoft.com/office/drawing/2014/main" id="{C416AB10-0CC3-4A0B-B55C-B06B44349E93}"/>
+                <a16:creationId xmlns:a16="http://schemas.microsoft.com/office/drawing/2014/main" xmlns="" id="{C416AB10-0CC3-4A0B-B55C-B06B44349E93}"/>
               </a:ext>
             </a:extLst>
           </p:cNvPr>
@@ -17891,7 +17891,7 @@
     </p:spTree>
     <p:extLst>
       <p:ext uri="{BB962C8B-B14F-4D97-AF65-F5344CB8AC3E}">
-        <p14:creationId xmlns="" xmlns:p14="http://schemas.microsoft.com/office/powerpoint/2010/main" val="3937679782"/>
+        <p14:creationId xmlns:p14="http://schemas.microsoft.com/office/powerpoint/2010/main" xmlns="" val="3937679782"/>
       </p:ext>
     </p:extLst>
   </p:cSld>
@@ -17923,7 +17923,7 @@
           <p:cNvPr id="2" name="Title 1">
             <a:extLst>
               <a:ext uri="{FF2B5EF4-FFF2-40B4-BE49-F238E27FC236}">
-                <a16:creationId xmlns="" xmlns:a16="http://schemas.microsoft.com/office/drawing/2014/main" id="{2EC7DE58-1CD0-48C0-A939-C21A685DBD08}"/>
+                <a16:creationId xmlns:a16="http://schemas.microsoft.com/office/drawing/2014/main" xmlns="" id="{2EC7DE58-1CD0-48C0-A939-C21A685DBD08}"/>
               </a:ext>
             </a:extLst>
           </p:cNvPr>
@@ -17959,7 +17959,7 @@
           <p:cNvPr id="6" name="Content Placeholder 5">
             <a:extLst>
               <a:ext uri="{FF2B5EF4-FFF2-40B4-BE49-F238E27FC236}">
-                <a16:creationId xmlns="" xmlns:a16="http://schemas.microsoft.com/office/drawing/2014/main" id="{C416AB10-0CC3-4A0B-B55C-B06B44349E93}"/>
+                <a16:creationId xmlns:a16="http://schemas.microsoft.com/office/drawing/2014/main" xmlns="" id="{C416AB10-0CC3-4A0B-B55C-B06B44349E93}"/>
               </a:ext>
             </a:extLst>
           </p:cNvPr>
@@ -18055,7 +18055,7 @@
           <p:cNvPr id="3" name="Rectangle 1">
             <a:extLst>
               <a:ext uri="{FF2B5EF4-FFF2-40B4-BE49-F238E27FC236}">
-                <a16:creationId xmlns="" xmlns:a16="http://schemas.microsoft.com/office/drawing/2014/main" id="{CE74CEC1-E575-4B91-BE60-8E0B3EB24952}"/>
+                <a16:creationId xmlns:a16="http://schemas.microsoft.com/office/drawing/2014/main" xmlns="" id="{CE74CEC1-E575-4B91-BE60-8E0B3EB24952}"/>
               </a:ext>
             </a:extLst>
           </p:cNvPr>
@@ -18087,7 +18087,7 @@
           <a:effectLst/>
           <a:extLst>
             <a:ext uri="{AF507438-7753-43E0-B8FC-AC1667EBCBE1}">
-              <a14:hiddenEffects xmlns="" xmlns:a14="http://schemas.microsoft.com/office/drawing/2010/main">
+              <a14:hiddenEffects xmlns:a14="http://schemas.microsoft.com/office/drawing/2010/main" xmlns="">
                 <a:effectLst>
                   <a:outerShdw dist="35921" dir="2700000" algn="ctr" rotWithShape="0">
                     <a:schemeClr val="bg2"/>
@@ -19252,7 +19252,7 @@
     </p:spTree>
     <p:extLst>
       <p:ext uri="{BB962C8B-B14F-4D97-AF65-F5344CB8AC3E}">
-        <p14:creationId xmlns="" xmlns:p14="http://schemas.microsoft.com/office/powerpoint/2010/main" val="3824740568"/>
+        <p14:creationId xmlns:p14="http://schemas.microsoft.com/office/powerpoint/2010/main" xmlns="" val="3824740568"/>
       </p:ext>
     </p:extLst>
   </p:cSld>
@@ -19284,7 +19284,7 @@
           <p:cNvPr id="2" name="Title 1">
             <a:extLst>
               <a:ext uri="{FF2B5EF4-FFF2-40B4-BE49-F238E27FC236}">
-                <a16:creationId xmlns="" xmlns:a16="http://schemas.microsoft.com/office/drawing/2014/main" id="{2EC7DE58-1CD0-48C0-A939-C21A685DBD08}"/>
+                <a16:creationId xmlns:a16="http://schemas.microsoft.com/office/drawing/2014/main" xmlns="" id="{2EC7DE58-1CD0-48C0-A939-C21A685DBD08}"/>
               </a:ext>
             </a:extLst>
           </p:cNvPr>
@@ -19320,7 +19320,7 @@
           <p:cNvPr id="6" name="Content Placeholder 5">
             <a:extLst>
               <a:ext uri="{FF2B5EF4-FFF2-40B4-BE49-F238E27FC236}">
-                <a16:creationId xmlns="" xmlns:a16="http://schemas.microsoft.com/office/drawing/2014/main" id="{C416AB10-0CC3-4A0B-B55C-B06B44349E93}"/>
+                <a16:creationId xmlns:a16="http://schemas.microsoft.com/office/drawing/2014/main" xmlns="" id="{C416AB10-0CC3-4A0B-B55C-B06B44349E93}"/>
               </a:ext>
             </a:extLst>
           </p:cNvPr>
@@ -19391,7 +19391,7 @@
           <p:cNvPr id="3" name="Rectangle 1">
             <a:extLst>
               <a:ext uri="{FF2B5EF4-FFF2-40B4-BE49-F238E27FC236}">
-                <a16:creationId xmlns="" xmlns:a16="http://schemas.microsoft.com/office/drawing/2014/main" id="{CE74CEC1-E575-4B91-BE60-8E0B3EB24952}"/>
+                <a16:creationId xmlns:a16="http://schemas.microsoft.com/office/drawing/2014/main" xmlns="" id="{CE74CEC1-E575-4B91-BE60-8E0B3EB24952}"/>
               </a:ext>
             </a:extLst>
           </p:cNvPr>
@@ -19423,7 +19423,7 @@
           <a:effectLst/>
           <a:extLst>
             <a:ext uri="{AF507438-7753-43E0-B8FC-AC1667EBCBE1}">
-              <a14:hiddenEffects xmlns="" xmlns:a14="http://schemas.microsoft.com/office/drawing/2010/main">
+              <a14:hiddenEffects xmlns:a14="http://schemas.microsoft.com/office/drawing/2010/main" xmlns="">
                 <a:effectLst>
                   <a:outerShdw dist="35921" dir="2700000" algn="ctr" rotWithShape="0">
                     <a:schemeClr val="bg2"/>
@@ -20280,7 +20280,7 @@
     </p:spTree>
     <p:extLst>
       <p:ext uri="{BB962C8B-B14F-4D97-AF65-F5344CB8AC3E}">
-        <p14:creationId xmlns="" xmlns:p14="http://schemas.microsoft.com/office/powerpoint/2010/main" val="1159620050"/>
+        <p14:creationId xmlns:p14="http://schemas.microsoft.com/office/powerpoint/2010/main" xmlns="" val="1159620050"/>
       </p:ext>
     </p:extLst>
   </p:cSld>
@@ -20312,7 +20312,7 @@
           <p:cNvPr id="2" name="Title 1">
             <a:extLst>
               <a:ext uri="{FF2B5EF4-FFF2-40B4-BE49-F238E27FC236}">
-                <a16:creationId xmlns="" xmlns:a16="http://schemas.microsoft.com/office/drawing/2014/main" id="{2EC7DE58-1CD0-48C0-A939-C21A685DBD08}"/>
+                <a16:creationId xmlns:a16="http://schemas.microsoft.com/office/drawing/2014/main" xmlns="" id="{2EC7DE58-1CD0-48C0-A939-C21A685DBD08}"/>
               </a:ext>
             </a:extLst>
           </p:cNvPr>
@@ -20348,7 +20348,7 @@
           <p:cNvPr id="6" name="Content Placeholder 5">
             <a:extLst>
               <a:ext uri="{FF2B5EF4-FFF2-40B4-BE49-F238E27FC236}">
-                <a16:creationId xmlns="" xmlns:a16="http://schemas.microsoft.com/office/drawing/2014/main" id="{C416AB10-0CC3-4A0B-B55C-B06B44349E93}"/>
+                <a16:creationId xmlns:a16="http://schemas.microsoft.com/office/drawing/2014/main" xmlns="" id="{C416AB10-0CC3-4A0B-B55C-B06B44349E93}"/>
               </a:ext>
             </a:extLst>
           </p:cNvPr>
@@ -20418,7 +20418,7 @@
           <p:cNvPr id="3" name="Rectangle 1">
             <a:extLst>
               <a:ext uri="{FF2B5EF4-FFF2-40B4-BE49-F238E27FC236}">
-                <a16:creationId xmlns="" xmlns:a16="http://schemas.microsoft.com/office/drawing/2014/main" id="{CE74CEC1-E575-4B91-BE60-8E0B3EB24952}"/>
+                <a16:creationId xmlns:a16="http://schemas.microsoft.com/office/drawing/2014/main" xmlns="" id="{CE74CEC1-E575-4B91-BE60-8E0B3EB24952}"/>
               </a:ext>
             </a:extLst>
           </p:cNvPr>
@@ -20450,7 +20450,7 @@
           <a:effectLst/>
           <a:extLst>
             <a:ext uri="{AF507438-7753-43E0-B8FC-AC1667EBCBE1}">
-              <a14:hiddenEffects xmlns="" xmlns:a14="http://schemas.microsoft.com/office/drawing/2010/main">
+              <a14:hiddenEffects xmlns:a14="http://schemas.microsoft.com/office/drawing/2010/main" xmlns="">
                 <a:effectLst>
                   <a:outerShdw dist="35921" dir="2700000" algn="ctr" rotWithShape="0">
                     <a:schemeClr val="bg2"/>
@@ -20782,7 +20782,7 @@
     </p:spTree>
     <p:extLst>
       <p:ext uri="{BB962C8B-B14F-4D97-AF65-F5344CB8AC3E}">
-        <p14:creationId xmlns="" xmlns:p14="http://schemas.microsoft.com/office/powerpoint/2010/main" val="1289335267"/>
+        <p14:creationId xmlns:p14="http://schemas.microsoft.com/office/powerpoint/2010/main" xmlns="" val="1289335267"/>
       </p:ext>
     </p:extLst>
   </p:cSld>
@@ -20814,7 +20814,7 @@
           <p:cNvPr id="2" name="Title 1">
             <a:extLst>
               <a:ext uri="{FF2B5EF4-FFF2-40B4-BE49-F238E27FC236}">
-                <a16:creationId xmlns="" xmlns:a16="http://schemas.microsoft.com/office/drawing/2014/main" id="{2EC7DE58-1CD0-48C0-A939-C21A685DBD08}"/>
+                <a16:creationId xmlns:a16="http://schemas.microsoft.com/office/drawing/2014/main" xmlns="" id="{2EC7DE58-1CD0-48C0-A939-C21A685DBD08}"/>
               </a:ext>
             </a:extLst>
           </p:cNvPr>
@@ -20850,7 +20850,7 @@
           <p:cNvPr id="6" name="Content Placeholder 5">
             <a:extLst>
               <a:ext uri="{FF2B5EF4-FFF2-40B4-BE49-F238E27FC236}">
-                <a16:creationId xmlns="" xmlns:a16="http://schemas.microsoft.com/office/drawing/2014/main" id="{C416AB10-0CC3-4A0B-B55C-B06B44349E93}"/>
+                <a16:creationId xmlns:a16="http://schemas.microsoft.com/office/drawing/2014/main" xmlns="" id="{C416AB10-0CC3-4A0B-B55C-B06B44349E93}"/>
               </a:ext>
             </a:extLst>
           </p:cNvPr>
@@ -20935,7 +20935,7 @@
           <p:cNvPr id="3" name="Rectangle 1">
             <a:extLst>
               <a:ext uri="{FF2B5EF4-FFF2-40B4-BE49-F238E27FC236}">
-                <a16:creationId xmlns="" xmlns:a16="http://schemas.microsoft.com/office/drawing/2014/main" id="{CE74CEC1-E575-4B91-BE60-8E0B3EB24952}"/>
+                <a16:creationId xmlns:a16="http://schemas.microsoft.com/office/drawing/2014/main" xmlns="" id="{CE74CEC1-E575-4B91-BE60-8E0B3EB24952}"/>
               </a:ext>
             </a:extLst>
           </p:cNvPr>
@@ -20967,7 +20967,7 @@
           <a:effectLst/>
           <a:extLst>
             <a:ext uri="{AF507438-7753-43E0-B8FC-AC1667EBCBE1}">
-              <a14:hiddenEffects xmlns="" xmlns:a14="http://schemas.microsoft.com/office/drawing/2010/main">
+              <a14:hiddenEffects xmlns:a14="http://schemas.microsoft.com/office/drawing/2010/main" xmlns="">
                 <a:effectLst>
                   <a:outerShdw dist="35921" dir="2700000" algn="ctr" rotWithShape="0">
                     <a:schemeClr val="bg2"/>
@@ -21721,7 +21721,7 @@
     </p:spTree>
     <p:extLst>
       <p:ext uri="{BB962C8B-B14F-4D97-AF65-F5344CB8AC3E}">
-        <p14:creationId xmlns="" xmlns:p14="http://schemas.microsoft.com/office/powerpoint/2010/main" val="1289335267"/>
+        <p14:creationId xmlns:p14="http://schemas.microsoft.com/office/powerpoint/2010/main" xmlns="" val="1289335267"/>
       </p:ext>
     </p:extLst>
   </p:cSld>
@@ -21753,7 +21753,7 @@
           <p:cNvPr id="2" name="Title 1">
             <a:extLst>
               <a:ext uri="{FF2B5EF4-FFF2-40B4-BE49-F238E27FC236}">
-                <a16:creationId xmlns="" xmlns:a16="http://schemas.microsoft.com/office/drawing/2014/main" id="{2EC7DE58-1CD0-48C0-A939-C21A685DBD08}"/>
+                <a16:creationId xmlns:a16="http://schemas.microsoft.com/office/drawing/2014/main" xmlns="" id="{2EC7DE58-1CD0-48C0-A939-C21A685DBD08}"/>
               </a:ext>
             </a:extLst>
           </p:cNvPr>
@@ -21789,7 +21789,7 @@
           <p:cNvPr id="6" name="Content Placeholder 5">
             <a:extLst>
               <a:ext uri="{FF2B5EF4-FFF2-40B4-BE49-F238E27FC236}">
-                <a16:creationId xmlns="" xmlns:a16="http://schemas.microsoft.com/office/drawing/2014/main" id="{C416AB10-0CC3-4A0B-B55C-B06B44349E93}"/>
+                <a16:creationId xmlns:a16="http://schemas.microsoft.com/office/drawing/2014/main" xmlns="" id="{C416AB10-0CC3-4A0B-B55C-B06B44349E93}"/>
               </a:ext>
             </a:extLst>
           </p:cNvPr>
@@ -21850,7 +21850,7 @@
           <p:cNvPr id="3" name="Rectangle 1">
             <a:extLst>
               <a:ext uri="{FF2B5EF4-FFF2-40B4-BE49-F238E27FC236}">
-                <a16:creationId xmlns="" xmlns:a16="http://schemas.microsoft.com/office/drawing/2014/main" id="{CE74CEC1-E575-4B91-BE60-8E0B3EB24952}"/>
+                <a16:creationId xmlns:a16="http://schemas.microsoft.com/office/drawing/2014/main" xmlns="" id="{CE74CEC1-E575-4B91-BE60-8E0B3EB24952}"/>
               </a:ext>
             </a:extLst>
           </p:cNvPr>
@@ -21882,7 +21882,7 @@
           <a:effectLst/>
           <a:extLst>
             <a:ext uri="{AF507438-7753-43E0-B8FC-AC1667EBCBE1}">
-              <a14:hiddenEffects xmlns="" xmlns:a14="http://schemas.microsoft.com/office/drawing/2010/main">
+              <a14:hiddenEffects xmlns:a14="http://schemas.microsoft.com/office/drawing/2010/main" xmlns="">
                 <a:effectLst>
                   <a:outerShdw dist="35921" dir="2700000" algn="ctr" rotWithShape="0">
                     <a:schemeClr val="bg2"/>
@@ -22411,7 +22411,7 @@
     </p:spTree>
     <p:extLst>
       <p:ext uri="{BB962C8B-B14F-4D97-AF65-F5344CB8AC3E}">
-        <p14:creationId xmlns="" xmlns:p14="http://schemas.microsoft.com/office/powerpoint/2010/main" val="1289335267"/>
+        <p14:creationId xmlns:p14="http://schemas.microsoft.com/office/powerpoint/2010/main" xmlns="" val="1289335267"/>
       </p:ext>
     </p:extLst>
   </p:cSld>
@@ -22484,14 +22484,14 @@
           </a:xfrm>
           <a:extLst>
             <a:ext uri="{909E8E84-426E-40DD-AFC4-6F175D3DCCD1}">
-              <a14:hiddenFill xmlns="" xmlns:a14="http://schemas.microsoft.com/office/drawing/2010/main">
+              <a14:hiddenFill xmlns:a14="http://schemas.microsoft.com/office/drawing/2010/main" xmlns="">
                 <a:solidFill>
                   <a:schemeClr val="accent1"/>
                 </a:solidFill>
               </a14:hiddenFill>
             </a:ext>
             <a:ext uri="{91240B29-F687-4F45-9708-019B960494DF}">
-              <a14:hiddenLine xmlns="" xmlns:a14="http://schemas.microsoft.com/office/drawing/2010/main" w="9525">
+              <a14:hiddenLine xmlns:a14="http://schemas.microsoft.com/office/drawing/2010/main" xmlns="" w="9525">
                 <a:solidFill>
                   <a:schemeClr val="tx1"/>
                 </a:solidFill>
@@ -22501,7 +22501,7 @@
               </a14:hiddenLine>
             </a:ext>
             <a:ext uri="{AF507438-7753-43E0-B8FC-AC1667EBCBE1}">
-              <a14:hiddenEffects xmlns="" xmlns:a14="http://schemas.microsoft.com/office/drawing/2010/main">
+              <a14:hiddenEffects xmlns:a14="http://schemas.microsoft.com/office/drawing/2010/main" xmlns="">
                 <a:effectLst>
                   <a:outerShdw dist="35921" dir="2700000" algn="ctr" rotWithShape="0">
                     <a:schemeClr val="bg2"/>
@@ -22622,7 +22622,7 @@
           <p:cNvPr id="8" name="Rectangle 3">
             <a:extLst>
               <a:ext uri="{FF2B5EF4-FFF2-40B4-BE49-F238E27FC236}">
-                <a16:creationId xmlns="" xmlns:a16="http://schemas.microsoft.com/office/drawing/2014/main" id="{3BE6E745-CC54-4246-910F-8E9ABE7F2B0E}"/>
+                <a16:creationId xmlns:a16="http://schemas.microsoft.com/office/drawing/2014/main" xmlns="" id="{3BE6E745-CC54-4246-910F-8E9ABE7F2B0E}"/>
               </a:ext>
             </a:extLst>
           </p:cNvPr>
@@ -22654,7 +22654,7 @@
           <a:effectLst/>
           <a:extLst>
             <a:ext uri="{AF507438-7753-43E0-B8FC-AC1667EBCBE1}">
-              <a14:hiddenEffects xmlns="" xmlns:a14="http://schemas.microsoft.com/office/drawing/2010/main">
+              <a14:hiddenEffects xmlns:a14="http://schemas.microsoft.com/office/drawing/2010/main" xmlns="">
                 <a:effectLst>
                   <a:outerShdw dist="35921" dir="2700000" algn="ctr" rotWithShape="0">
                     <a:schemeClr val="bg2"/>
@@ -23103,7 +23103,7 @@
           <p:cNvPr id="9" name="Rectangle 4">
             <a:extLst>
               <a:ext uri="{FF2B5EF4-FFF2-40B4-BE49-F238E27FC236}">
-                <a16:creationId xmlns="" xmlns:a16="http://schemas.microsoft.com/office/drawing/2014/main" id="{353910E6-4D73-4A07-94A7-E90E9A3A4F78}"/>
+                <a16:creationId xmlns:a16="http://schemas.microsoft.com/office/drawing/2014/main" xmlns="" id="{353910E6-4D73-4A07-94A7-E90E9A3A4F78}"/>
               </a:ext>
             </a:extLst>
           </p:cNvPr>
@@ -23135,7 +23135,7 @@
           <a:effectLst/>
           <a:extLst>
             <a:ext uri="{AF507438-7753-43E0-B8FC-AC1667EBCBE1}">
-              <a14:hiddenEffects xmlns="" xmlns:a14="http://schemas.microsoft.com/office/drawing/2010/main">
+              <a14:hiddenEffects xmlns:a14="http://schemas.microsoft.com/office/drawing/2010/main" xmlns="">
                 <a:effectLst>
                   <a:outerShdw dist="35921" dir="2700000" algn="ctr" rotWithShape="0">
                     <a:schemeClr val="bg2"/>
@@ -23177,7 +23177,7 @@
           <p:cNvPr id="5" name="Rectangle 2">
             <a:extLst>
               <a:ext uri="{FF2B5EF4-FFF2-40B4-BE49-F238E27FC236}">
-                <a16:creationId xmlns="" xmlns:a16="http://schemas.microsoft.com/office/drawing/2014/main" id="{8A098FF3-1F0D-4A99-9B77-4EE7C9B39725}"/>
+                <a16:creationId xmlns:a16="http://schemas.microsoft.com/office/drawing/2014/main" xmlns="" id="{8A098FF3-1F0D-4A99-9B77-4EE7C9B39725}"/>
               </a:ext>
             </a:extLst>
           </p:cNvPr>
@@ -23209,7 +23209,7 @@
           <a:effectLst/>
           <a:extLst>
             <a:ext uri="{AF507438-7753-43E0-B8FC-AC1667EBCBE1}">
-              <a14:hiddenEffects xmlns="" xmlns:a14="http://schemas.microsoft.com/office/drawing/2010/main">
+              <a14:hiddenEffects xmlns:a14="http://schemas.microsoft.com/office/drawing/2010/main" xmlns="">
                 <a:effectLst>
                   <a:outerShdw dist="35921" dir="2700000" algn="ctr" rotWithShape="0">
                     <a:schemeClr val="bg2"/>
@@ -23305,7 +23305,7 @@
           <p:cNvPr id="7" name="Rectangle 4">
             <a:extLst>
               <a:ext uri="{FF2B5EF4-FFF2-40B4-BE49-F238E27FC236}">
-                <a16:creationId xmlns="" xmlns:a16="http://schemas.microsoft.com/office/drawing/2014/main" id="{763B56D9-AE97-4D38-878A-F86E3E39DE02}"/>
+                <a16:creationId xmlns:a16="http://schemas.microsoft.com/office/drawing/2014/main" xmlns="" id="{763B56D9-AE97-4D38-878A-F86E3E39DE02}"/>
               </a:ext>
             </a:extLst>
           </p:cNvPr>
@@ -23408,7 +23408,7 @@
     </p:spTree>
     <p:extLst>
       <p:ext uri="{BB962C8B-B14F-4D97-AF65-F5344CB8AC3E}">
-        <p14:creationId xmlns="" xmlns:p14="http://schemas.microsoft.com/office/powerpoint/2010/main" val="2782972881"/>
+        <p14:creationId xmlns:p14="http://schemas.microsoft.com/office/powerpoint/2010/main" xmlns="" val="2782972881"/>
       </p:ext>
     </p:extLst>
   </p:cSld>
@@ -23440,7 +23440,7 @@
           <p:cNvPr id="2" name="Title 1">
             <a:extLst>
               <a:ext uri="{FF2B5EF4-FFF2-40B4-BE49-F238E27FC236}">
-                <a16:creationId xmlns="" xmlns:a16="http://schemas.microsoft.com/office/drawing/2014/main" id="{2EC7DE58-1CD0-48C0-A939-C21A685DBD08}"/>
+                <a16:creationId xmlns:a16="http://schemas.microsoft.com/office/drawing/2014/main" xmlns="" id="{2EC7DE58-1CD0-48C0-A939-C21A685DBD08}"/>
               </a:ext>
             </a:extLst>
           </p:cNvPr>
@@ -23476,7 +23476,7 @@
           <p:cNvPr id="6" name="Content Placeholder 5">
             <a:extLst>
               <a:ext uri="{FF2B5EF4-FFF2-40B4-BE49-F238E27FC236}">
-                <a16:creationId xmlns="" xmlns:a16="http://schemas.microsoft.com/office/drawing/2014/main" id="{C416AB10-0CC3-4A0B-B55C-B06B44349E93}"/>
+                <a16:creationId xmlns:a16="http://schemas.microsoft.com/office/drawing/2014/main" xmlns="" id="{C416AB10-0CC3-4A0B-B55C-B06B44349E93}"/>
               </a:ext>
             </a:extLst>
           </p:cNvPr>
@@ -23545,7 +23545,7 @@
           <p:cNvPr id="3" name="Rectangle 1">
             <a:extLst>
               <a:ext uri="{FF2B5EF4-FFF2-40B4-BE49-F238E27FC236}">
-                <a16:creationId xmlns="" xmlns:a16="http://schemas.microsoft.com/office/drawing/2014/main" id="{CE74CEC1-E575-4B91-BE60-8E0B3EB24952}"/>
+                <a16:creationId xmlns:a16="http://schemas.microsoft.com/office/drawing/2014/main" xmlns="" id="{CE74CEC1-E575-4B91-BE60-8E0B3EB24952}"/>
               </a:ext>
             </a:extLst>
           </p:cNvPr>
@@ -23577,7 +23577,7 @@
           <a:effectLst/>
           <a:extLst>
             <a:ext uri="{AF507438-7753-43E0-B8FC-AC1667EBCBE1}">
-              <a14:hiddenEffects xmlns="" xmlns:a14="http://schemas.microsoft.com/office/drawing/2010/main">
+              <a14:hiddenEffects xmlns:a14="http://schemas.microsoft.com/office/drawing/2010/main" xmlns="">
                 <a:effectLst>
                   <a:outerShdw dist="35921" dir="2700000" algn="ctr" rotWithShape="0">
                     <a:schemeClr val="bg2"/>
@@ -24145,7 +24145,7 @@
     </p:spTree>
     <p:extLst>
       <p:ext uri="{BB962C8B-B14F-4D97-AF65-F5344CB8AC3E}">
-        <p14:creationId xmlns="" xmlns:p14="http://schemas.microsoft.com/office/powerpoint/2010/main" val="1289335267"/>
+        <p14:creationId xmlns:p14="http://schemas.microsoft.com/office/powerpoint/2010/main" xmlns="" val="1289335267"/>
       </p:ext>
     </p:extLst>
   </p:cSld>
@@ -24177,7 +24177,7 @@
           <p:cNvPr id="2" name="Title 1">
             <a:extLst>
               <a:ext uri="{FF2B5EF4-FFF2-40B4-BE49-F238E27FC236}">
-                <a16:creationId xmlns="" xmlns:a16="http://schemas.microsoft.com/office/drawing/2014/main" id="{2EC7DE58-1CD0-48C0-A939-C21A685DBD08}"/>
+                <a16:creationId xmlns:a16="http://schemas.microsoft.com/office/drawing/2014/main" xmlns="" id="{2EC7DE58-1CD0-48C0-A939-C21A685DBD08}"/>
               </a:ext>
             </a:extLst>
           </p:cNvPr>
@@ -24213,7 +24213,7 @@
           <p:cNvPr id="6" name="Content Placeholder 5">
             <a:extLst>
               <a:ext uri="{FF2B5EF4-FFF2-40B4-BE49-F238E27FC236}">
-                <a16:creationId xmlns="" xmlns:a16="http://schemas.microsoft.com/office/drawing/2014/main" id="{C416AB10-0CC3-4A0B-B55C-B06B44349E93}"/>
+                <a16:creationId xmlns:a16="http://schemas.microsoft.com/office/drawing/2014/main" xmlns="" id="{C416AB10-0CC3-4A0B-B55C-B06B44349E93}"/>
               </a:ext>
             </a:extLst>
           </p:cNvPr>
@@ -24301,7 +24301,7 @@
           <p:cNvPr id="3" name="Rectangle 1">
             <a:extLst>
               <a:ext uri="{FF2B5EF4-FFF2-40B4-BE49-F238E27FC236}">
-                <a16:creationId xmlns="" xmlns:a16="http://schemas.microsoft.com/office/drawing/2014/main" id="{CE74CEC1-E575-4B91-BE60-8E0B3EB24952}"/>
+                <a16:creationId xmlns:a16="http://schemas.microsoft.com/office/drawing/2014/main" xmlns="" id="{CE74CEC1-E575-4B91-BE60-8E0B3EB24952}"/>
               </a:ext>
             </a:extLst>
           </p:cNvPr>
@@ -24333,7 +24333,7 @@
           <a:effectLst/>
           <a:extLst>
             <a:ext uri="{AF507438-7753-43E0-B8FC-AC1667EBCBE1}">
-              <a14:hiddenEffects xmlns="" xmlns:a14="http://schemas.microsoft.com/office/drawing/2010/main">
+              <a14:hiddenEffects xmlns:a14="http://schemas.microsoft.com/office/drawing/2010/main" xmlns="">
                 <a:effectLst>
                   <a:outerShdw dist="35921" dir="2700000" algn="ctr" rotWithShape="0">
                     <a:schemeClr val="bg2"/>
@@ -25088,7 +25088,7 @@
     </p:spTree>
     <p:extLst>
       <p:ext uri="{BB962C8B-B14F-4D97-AF65-F5344CB8AC3E}">
-        <p14:creationId xmlns="" xmlns:p14="http://schemas.microsoft.com/office/powerpoint/2010/main" val="1289335267"/>
+        <p14:creationId xmlns:p14="http://schemas.microsoft.com/office/powerpoint/2010/main" xmlns="" val="1289335267"/>
       </p:ext>
     </p:extLst>
   </p:cSld>
@@ -25120,7 +25120,7 @@
           <p:cNvPr id="2" name="Title 1">
             <a:extLst>
               <a:ext uri="{FF2B5EF4-FFF2-40B4-BE49-F238E27FC236}">
-                <a16:creationId xmlns="" xmlns:a16="http://schemas.microsoft.com/office/drawing/2014/main" id="{2EC7DE58-1CD0-48C0-A939-C21A685DBD08}"/>
+                <a16:creationId xmlns:a16="http://schemas.microsoft.com/office/drawing/2014/main" xmlns="" id="{2EC7DE58-1CD0-48C0-A939-C21A685DBD08}"/>
               </a:ext>
             </a:extLst>
           </p:cNvPr>
@@ -25156,7 +25156,7 @@
           <p:cNvPr id="6" name="Content Placeholder 5">
             <a:extLst>
               <a:ext uri="{FF2B5EF4-FFF2-40B4-BE49-F238E27FC236}">
-                <a16:creationId xmlns="" xmlns:a16="http://schemas.microsoft.com/office/drawing/2014/main" id="{C416AB10-0CC3-4A0B-B55C-B06B44349E93}"/>
+                <a16:creationId xmlns:a16="http://schemas.microsoft.com/office/drawing/2014/main" xmlns="" id="{C416AB10-0CC3-4A0B-B55C-B06B44349E93}"/>
               </a:ext>
             </a:extLst>
           </p:cNvPr>
@@ -25229,7 +25229,7 @@
           <p:cNvPr id="3" name="Rectangle 1">
             <a:extLst>
               <a:ext uri="{FF2B5EF4-FFF2-40B4-BE49-F238E27FC236}">
-                <a16:creationId xmlns="" xmlns:a16="http://schemas.microsoft.com/office/drawing/2014/main" id="{CE74CEC1-E575-4B91-BE60-8E0B3EB24952}"/>
+                <a16:creationId xmlns:a16="http://schemas.microsoft.com/office/drawing/2014/main" xmlns="" id="{CE74CEC1-E575-4B91-BE60-8E0B3EB24952}"/>
               </a:ext>
             </a:extLst>
           </p:cNvPr>
@@ -25261,7 +25261,7 @@
           <a:effectLst/>
           <a:extLst>
             <a:ext uri="{AF507438-7753-43E0-B8FC-AC1667EBCBE1}">
-              <a14:hiddenEffects xmlns="" xmlns:a14="http://schemas.microsoft.com/office/drawing/2010/main">
+              <a14:hiddenEffects xmlns:a14="http://schemas.microsoft.com/office/drawing/2010/main" xmlns="">
                 <a:effectLst>
                   <a:outerShdw dist="35921" dir="2700000" algn="ctr" rotWithShape="0">
                     <a:schemeClr val="bg2"/>
@@ -25836,7 +25836,7 @@
     </p:spTree>
     <p:extLst>
       <p:ext uri="{BB962C8B-B14F-4D97-AF65-F5344CB8AC3E}">
-        <p14:creationId xmlns="" xmlns:p14="http://schemas.microsoft.com/office/powerpoint/2010/main" val="1289335267"/>
+        <p14:creationId xmlns:p14="http://schemas.microsoft.com/office/powerpoint/2010/main" xmlns="" val="1289335267"/>
       </p:ext>
     </p:extLst>
   </p:cSld>
@@ -25868,7 +25868,7 @@
           <p:cNvPr id="2" name="Title 1">
             <a:extLst>
               <a:ext uri="{FF2B5EF4-FFF2-40B4-BE49-F238E27FC236}">
-                <a16:creationId xmlns="" xmlns:a16="http://schemas.microsoft.com/office/drawing/2014/main" id="{2EC7DE58-1CD0-48C0-A939-C21A685DBD08}"/>
+                <a16:creationId xmlns:a16="http://schemas.microsoft.com/office/drawing/2014/main" xmlns="" id="{2EC7DE58-1CD0-48C0-A939-C21A685DBD08}"/>
               </a:ext>
             </a:extLst>
           </p:cNvPr>
@@ -25904,7 +25904,7 @@
           <p:cNvPr id="6" name="Content Placeholder 5">
             <a:extLst>
               <a:ext uri="{FF2B5EF4-FFF2-40B4-BE49-F238E27FC236}">
-                <a16:creationId xmlns="" xmlns:a16="http://schemas.microsoft.com/office/drawing/2014/main" id="{C416AB10-0CC3-4A0B-B55C-B06B44349E93}"/>
+                <a16:creationId xmlns:a16="http://schemas.microsoft.com/office/drawing/2014/main" xmlns="" id="{C416AB10-0CC3-4A0B-B55C-B06B44349E93}"/>
               </a:ext>
             </a:extLst>
           </p:cNvPr>
@@ -25949,7 +25949,7 @@
           <p:cNvPr id="3" name="Rectangle 1">
             <a:extLst>
               <a:ext uri="{FF2B5EF4-FFF2-40B4-BE49-F238E27FC236}">
-                <a16:creationId xmlns="" xmlns:a16="http://schemas.microsoft.com/office/drawing/2014/main" id="{CE74CEC1-E575-4B91-BE60-8E0B3EB24952}"/>
+                <a16:creationId xmlns:a16="http://schemas.microsoft.com/office/drawing/2014/main" xmlns="" id="{CE74CEC1-E575-4B91-BE60-8E0B3EB24952}"/>
               </a:ext>
             </a:extLst>
           </p:cNvPr>
@@ -25981,7 +25981,7 @@
           <a:effectLst/>
           <a:extLst>
             <a:ext uri="{AF507438-7753-43E0-B8FC-AC1667EBCBE1}">
-              <a14:hiddenEffects xmlns="" xmlns:a14="http://schemas.microsoft.com/office/drawing/2010/main">
+              <a14:hiddenEffects xmlns:a14="http://schemas.microsoft.com/office/drawing/2010/main" xmlns="">
                 <a:effectLst>
                   <a:outerShdw dist="35921" dir="2700000" algn="ctr" rotWithShape="0">
                     <a:schemeClr val="bg2"/>
@@ -27065,7 +27065,7 @@
     </p:spTree>
     <p:extLst>
       <p:ext uri="{BB962C8B-B14F-4D97-AF65-F5344CB8AC3E}">
-        <p14:creationId xmlns="" xmlns:p14="http://schemas.microsoft.com/office/powerpoint/2010/main" val="1289335267"/>
+        <p14:creationId xmlns:p14="http://schemas.microsoft.com/office/powerpoint/2010/main" xmlns="" val="1289335267"/>
       </p:ext>
     </p:extLst>
   </p:cSld>
@@ -32657,14 +32657,14 @@
           </a:xfrm>
           <a:extLst>
             <a:ext uri="{909E8E84-426E-40DD-AFC4-6F175D3DCCD1}">
-              <a14:hiddenFill xmlns="" xmlns:a14="http://schemas.microsoft.com/office/drawing/2010/main">
+              <a14:hiddenFill xmlns:a14="http://schemas.microsoft.com/office/drawing/2010/main" xmlns="">
                 <a:solidFill>
                   <a:schemeClr val="accent1"/>
                 </a:solidFill>
               </a14:hiddenFill>
             </a:ext>
             <a:ext uri="{91240B29-F687-4F45-9708-019B960494DF}">
-              <a14:hiddenLine xmlns="" xmlns:a14="http://schemas.microsoft.com/office/drawing/2010/main" w="9525">
+              <a14:hiddenLine xmlns:a14="http://schemas.microsoft.com/office/drawing/2010/main" xmlns="" w="9525">
                 <a:solidFill>
                   <a:schemeClr val="tx1"/>
                 </a:solidFill>
@@ -32674,7 +32674,7 @@
               </a14:hiddenLine>
             </a:ext>
             <a:ext uri="{AF507438-7753-43E0-B8FC-AC1667EBCBE1}">
-              <a14:hiddenEffects xmlns="" xmlns:a14="http://schemas.microsoft.com/office/drawing/2010/main">
+              <a14:hiddenEffects xmlns:a14="http://schemas.microsoft.com/office/drawing/2010/main" xmlns="">
                 <a:effectLst>
                   <a:outerShdw dist="35921" dir="2700000" algn="ctr" rotWithShape="0">
                     <a:schemeClr val="bg2"/>
@@ -32714,14 +32714,14 @@
           </a:xfrm>
           <a:extLst>
             <a:ext uri="{909E8E84-426E-40DD-AFC4-6F175D3DCCD1}">
-              <a14:hiddenFill xmlns="" xmlns:a14="http://schemas.microsoft.com/office/drawing/2010/main">
+              <a14:hiddenFill xmlns:a14="http://schemas.microsoft.com/office/drawing/2010/main" xmlns="">
                 <a:solidFill>
                   <a:schemeClr val="accent1"/>
                 </a:solidFill>
               </a14:hiddenFill>
             </a:ext>
             <a:ext uri="{91240B29-F687-4F45-9708-019B960494DF}">
-              <a14:hiddenLine xmlns="" xmlns:a14="http://schemas.microsoft.com/office/drawing/2010/main" w="9525">
+              <a14:hiddenLine xmlns:a14="http://schemas.microsoft.com/office/drawing/2010/main" xmlns="" w="9525">
                 <a:solidFill>
                   <a:schemeClr val="tx1"/>
                 </a:solidFill>
@@ -32731,7 +32731,7 @@
               </a14:hiddenLine>
             </a:ext>
             <a:ext uri="{AF507438-7753-43E0-B8FC-AC1667EBCBE1}">
-              <a14:hiddenEffects xmlns="" xmlns:a14="http://schemas.microsoft.com/office/drawing/2010/main">
+              <a14:hiddenEffects xmlns:a14="http://schemas.microsoft.com/office/drawing/2010/main" xmlns="">
                 <a:effectLst>
                   <a:outerShdw dist="35921" dir="2700000" algn="ctr" rotWithShape="0">
                     <a:schemeClr val="bg2"/>
@@ -32820,7 +32820,7 @@
           <p:cNvPr id="9" name="Rectangle 4">
             <a:extLst>
               <a:ext uri="{FF2B5EF4-FFF2-40B4-BE49-F238E27FC236}">
-                <a16:creationId xmlns="" xmlns:a16="http://schemas.microsoft.com/office/drawing/2014/main" id="{353910E6-4D73-4A07-94A7-E90E9A3A4F78}"/>
+                <a16:creationId xmlns:a16="http://schemas.microsoft.com/office/drawing/2014/main" xmlns="" id="{353910E6-4D73-4A07-94A7-E90E9A3A4F78}"/>
               </a:ext>
             </a:extLst>
           </p:cNvPr>
@@ -32852,7 +32852,7 @@
           <a:effectLst/>
           <a:extLst>
             <a:ext uri="{AF507438-7753-43E0-B8FC-AC1667EBCBE1}">
-              <a14:hiddenEffects xmlns="" xmlns:a14="http://schemas.microsoft.com/office/drawing/2010/main">
+              <a14:hiddenEffects xmlns:a14="http://schemas.microsoft.com/office/drawing/2010/main" xmlns="">
                 <a:effectLst>
                   <a:outerShdw dist="35921" dir="2700000" algn="ctr" rotWithShape="0">
                     <a:schemeClr val="bg2"/>
@@ -32894,7 +32894,7 @@
           <p:cNvPr id="4" name="Rectangle 1">
             <a:extLst>
               <a:ext uri="{FF2B5EF4-FFF2-40B4-BE49-F238E27FC236}">
-                <a16:creationId xmlns="" xmlns:a16="http://schemas.microsoft.com/office/drawing/2014/main" id="{54D91266-8F6B-486F-A31A-4B1217D8A1D8}"/>
+                <a16:creationId xmlns:a16="http://schemas.microsoft.com/office/drawing/2014/main" xmlns="" id="{54D91266-8F6B-486F-A31A-4B1217D8A1D8}"/>
               </a:ext>
             </a:extLst>
           </p:cNvPr>
@@ -32926,7 +32926,7 @@
           <a:effectLst/>
           <a:extLst>
             <a:ext uri="{AF507438-7753-43E0-B8FC-AC1667EBCBE1}">
-              <a14:hiddenEffects xmlns="" xmlns:a14="http://schemas.microsoft.com/office/drawing/2010/main">
+              <a14:hiddenEffects xmlns:a14="http://schemas.microsoft.com/office/drawing/2010/main" xmlns="">
                 <a:effectLst>
                   <a:outerShdw dist="35921" dir="2700000" algn="ctr" rotWithShape="0">
                     <a:schemeClr val="bg2"/>
@@ -33406,7 +33406,7 @@
     </p:spTree>
     <p:extLst>
       <p:ext uri="{BB962C8B-B14F-4D97-AF65-F5344CB8AC3E}">
-        <p14:creationId xmlns="" xmlns:p14="http://schemas.microsoft.com/office/powerpoint/2010/main" val="716412187"/>
+        <p14:creationId xmlns:p14="http://schemas.microsoft.com/office/powerpoint/2010/main" xmlns="" val="716412187"/>
       </p:ext>
     </p:extLst>
   </p:cSld>
@@ -36507,7 +36507,7 @@
               </a:buClr>
             </a:pPr>
             <a:r>
-              <a:rPr lang="en-US" altLang="en-US" sz="1200" dirty="0">
+              <a:rPr lang="en-US" altLang="en-US" sz="1200" dirty="0" smtClean="0">
                 <a:latin typeface="Courier New" pitchFamily="49" charset="0"/>
                 <a:cs typeface="Courier New" pitchFamily="49" charset="0"/>
               </a:rPr>
@@ -36530,7 +36530,7 @@
               </a:buClr>
             </a:pPr>
             <a:r>
-              <a:rPr lang="en-US" altLang="en-US" sz="1200" dirty="0">
+              <a:rPr lang="en-US" altLang="en-US" sz="1200" dirty="0" smtClean="0">
                 <a:latin typeface="Courier New" pitchFamily="49" charset="0"/>
                 <a:cs typeface="Courier New" pitchFamily="49" charset="0"/>
               </a:rPr>
@@ -36553,35 +36553,35 @@
               </a:buClr>
             </a:pPr>
             <a:r>
-              <a:rPr lang="en-US" altLang="en-US" sz="1200" dirty="0">
+              <a:rPr lang="en-US" altLang="en-US" sz="1200" dirty="0" smtClean="0">
                 <a:latin typeface="Courier New" pitchFamily="49" charset="0"/>
                 <a:cs typeface="Courier New" pitchFamily="49" charset="0"/>
               </a:rPr>
               <a:t>			        .filter(((Predicate&lt;Person&gt;)p-&gt;</a:t>
             </a:r>
             <a:r>
-              <a:rPr lang="en-US" altLang="en-US" sz="1200" dirty="0" err="1">
+              <a:rPr lang="en-US" altLang="en-US" sz="1200" dirty="0" err="1" smtClean="0">
                 <a:latin typeface="Courier New" pitchFamily="49" charset="0"/>
                 <a:cs typeface="Courier New" pitchFamily="49" charset="0"/>
               </a:rPr>
               <a:t>p.getAge</a:t>
             </a:r>
             <a:r>
-              <a:rPr lang="en-US" altLang="en-US" sz="1200" dirty="0">
+              <a:rPr lang="en-US" altLang="en-US" sz="1200" dirty="0" smtClean="0">
                 <a:latin typeface="Courier New" pitchFamily="49" charset="0"/>
                 <a:cs typeface="Courier New" pitchFamily="49" charset="0"/>
               </a:rPr>
               <a:t>() &gt; 18).</a:t>
             </a:r>
             <a:r>
-              <a:rPr lang="en-US" altLang="en-US" sz="1200" b="1" dirty="0">
+              <a:rPr lang="en-US" altLang="en-US" sz="1200" b="1" dirty="0" smtClean="0">
                 <a:latin typeface="Courier New" pitchFamily="49" charset="0"/>
                 <a:cs typeface="Courier New" pitchFamily="49" charset="0"/>
               </a:rPr>
               <a:t>negate</a:t>
             </a:r>
             <a:r>
-              <a:rPr lang="en-US" altLang="en-US" sz="1200" dirty="0">
+              <a:rPr lang="en-US" altLang="en-US" sz="1200" dirty="0" smtClean="0">
                 <a:latin typeface="Courier New" pitchFamily="49" charset="0"/>
                 <a:cs typeface="Courier New" pitchFamily="49" charset="0"/>
               </a:rPr>
@@ -36604,49 +36604,49 @@
               </a:buClr>
             </a:pPr>
             <a:r>
-              <a:rPr lang="en-US" altLang="en-US" sz="1200" dirty="0">
+              <a:rPr lang="en-US" altLang="en-US" sz="1200" dirty="0" smtClean="0">
                 <a:latin typeface="Courier New" pitchFamily="49" charset="0"/>
                 <a:cs typeface="Courier New" pitchFamily="49" charset="0"/>
               </a:rPr>
               <a:t>			        .collect(</a:t>
             </a:r>
             <a:r>
-              <a:rPr lang="en-US" altLang="en-US" sz="1200" dirty="0" err="1">
+              <a:rPr lang="en-US" altLang="en-US" sz="1200" dirty="0" err="1" smtClean="0">
                 <a:latin typeface="Courier New" pitchFamily="49" charset="0"/>
                 <a:cs typeface="Courier New" pitchFamily="49" charset="0"/>
               </a:rPr>
               <a:t>Collectors.toMap</a:t>
             </a:r>
             <a:r>
-              <a:rPr lang="en-US" altLang="en-US" sz="1200" dirty="0">
+              <a:rPr lang="en-US" altLang="en-US" sz="1200" dirty="0" smtClean="0">
                 <a:latin typeface="Courier New" pitchFamily="49" charset="0"/>
                 <a:cs typeface="Courier New" pitchFamily="49" charset="0"/>
               </a:rPr>
               <a:t>(Person::</a:t>
             </a:r>
             <a:r>
-              <a:rPr lang="en-US" altLang="en-US" sz="1200" dirty="0" err="1">
+              <a:rPr lang="en-US" altLang="en-US" sz="1200" dirty="0" err="1" smtClean="0">
                 <a:latin typeface="Courier New" pitchFamily="49" charset="0"/>
                 <a:cs typeface="Courier New" pitchFamily="49" charset="0"/>
               </a:rPr>
               <a:t>getName</a:t>
             </a:r>
             <a:r>
-              <a:rPr lang="en-US" altLang="en-US" sz="1200" dirty="0">
+              <a:rPr lang="en-US" altLang="en-US" sz="1200" dirty="0" smtClean="0">
                 <a:latin typeface="Courier New" pitchFamily="49" charset="0"/>
                 <a:cs typeface="Courier New" pitchFamily="49" charset="0"/>
               </a:rPr>
               <a:t>, Person::</a:t>
             </a:r>
             <a:r>
-              <a:rPr lang="en-US" altLang="en-US" sz="1200" dirty="0" err="1">
+              <a:rPr lang="en-US" altLang="en-US" sz="1200" dirty="0" err="1" smtClean="0">
                 <a:latin typeface="Courier New" pitchFamily="49" charset="0"/>
                 <a:cs typeface="Courier New" pitchFamily="49" charset="0"/>
               </a:rPr>
               <a:t>getAge</a:t>
             </a:r>
             <a:r>
-              <a:rPr lang="en-US" altLang="en-US" sz="1200" dirty="0">
+              <a:rPr lang="en-US" altLang="en-US" sz="1200" dirty="0" smtClean="0">
                 <a:latin typeface="Courier New" pitchFamily="49" charset="0"/>
                 <a:cs typeface="Courier New" pitchFamily="49" charset="0"/>
               </a:rPr>
@@ -36668,40 +36668,44 @@
                 <a:schemeClr val="tx2"/>
               </a:buClr>
             </a:pPr>
+            <a:endParaRPr lang="en-US" altLang="en-US" sz="1200" dirty="0" smtClean="0">
+              <a:latin typeface="Courier New" pitchFamily="49" charset="0"/>
+              <a:cs typeface="Courier New" pitchFamily="49" charset="0"/>
+            </a:endParaRPr>
+          </a:p>
+          <a:p>
+            <a:pPr indent="-228600" defTabSz="914400" eaLnBrk="0" fontAlgn="base" hangingPunct="0">
+              <a:lnSpc>
+                <a:spcPct val="110000"/>
+              </a:lnSpc>
+              <a:spcBef>
+                <a:spcPct val="0"/>
+              </a:spcBef>
+              <a:spcAft>
+                <a:spcPct val="0"/>
+              </a:spcAft>
+              <a:buClr>
+                <a:schemeClr val="tx2"/>
+              </a:buClr>
+            </a:pPr>
+            <a:r>
+              <a:rPr lang="en-US" altLang="en-US" sz="1200" dirty="0" err="1" smtClean="0">
+                <a:latin typeface="Courier New" pitchFamily="49" charset="0"/>
+                <a:cs typeface="Courier New" pitchFamily="49" charset="0"/>
+              </a:rPr>
+              <a:t>System.out.println</a:t>
+            </a:r>
+            <a:r>
+              <a:rPr lang="en-US" altLang="en-US" sz="1200" dirty="0" smtClean="0">
+                <a:latin typeface="Courier New" pitchFamily="49" charset="0"/>
+                <a:cs typeface="Courier New" pitchFamily="49" charset="0"/>
+              </a:rPr>
+              <a:t>(filtered);    // {Max=18, David=12}</a:t>
+            </a:r>
             <a:endParaRPr lang="en-US" altLang="en-US" sz="1200" dirty="0">
               <a:latin typeface="Courier New" pitchFamily="49" charset="0"/>
               <a:cs typeface="Courier New" pitchFamily="49" charset="0"/>
             </a:endParaRPr>
-          </a:p>
-          <a:p>
-            <a:pPr indent="-228600" defTabSz="914400" eaLnBrk="0" fontAlgn="base" hangingPunct="0">
-              <a:lnSpc>
-                <a:spcPct val="110000"/>
-              </a:lnSpc>
-              <a:spcBef>
-                <a:spcPct val="0"/>
-              </a:spcBef>
-              <a:spcAft>
-                <a:spcPct val="0"/>
-              </a:spcAft>
-              <a:buClr>
-                <a:schemeClr val="tx2"/>
-              </a:buClr>
-            </a:pPr>
-            <a:r>
-              <a:rPr lang="en-US" altLang="en-US" sz="1200" dirty="0" err="1">
-                <a:latin typeface="Courier New" pitchFamily="49" charset="0"/>
-                <a:cs typeface="Courier New" pitchFamily="49" charset="0"/>
-              </a:rPr>
-              <a:t>System.out.println</a:t>
-            </a:r>
-            <a:r>
-              <a:rPr lang="en-US" altLang="en-US" sz="1200" dirty="0">
-                <a:latin typeface="Courier New" pitchFamily="49" charset="0"/>
-                <a:cs typeface="Courier New" pitchFamily="49" charset="0"/>
-              </a:rPr>
-              <a:t>(filtered);    // {Max=18, David=12}</a:t>
-            </a:r>
           </a:p>
         </p:txBody>
       </p:sp>
@@ -36963,11 +36967,39 @@
               <a:t>persons.stream</a:t>
             </a:r>
             <a:r>
-              <a:rPr lang="en-US" altLang="en-US" sz="1200" dirty="0">
-                <a:latin typeface="Courier New" pitchFamily="49" charset="0"/>
-                <a:cs typeface="Courier New" pitchFamily="49" charset="0"/>
-              </a:rPr>
-              <a:t>().collect(</a:t>
+              <a:rPr lang="en-US" altLang="en-US" sz="1200" dirty="0" smtClean="0">
+                <a:latin typeface="Courier New" pitchFamily="49" charset="0"/>
+                <a:cs typeface="Courier New" pitchFamily="49" charset="0"/>
+              </a:rPr>
+              <a:t>().</a:t>
+            </a:r>
+            <a:r>
+              <a:rPr lang="en-US" altLang="en-US" sz="1200" dirty="0" smtClean="0">
+                <a:latin typeface="Courier New" pitchFamily="49" charset="0"/>
+                <a:cs typeface="Courier New" pitchFamily="49" charset="0"/>
+              </a:rPr>
+              <a:t>map(Person::</a:t>
+            </a:r>
+            <a:r>
+              <a:rPr lang="en-US" altLang="en-US" sz="1200" dirty="0" err="1" smtClean="0">
+                <a:latin typeface="Courier New" pitchFamily="49" charset="0"/>
+                <a:cs typeface="Courier New" pitchFamily="49" charset="0"/>
+              </a:rPr>
+              <a:t>getName</a:t>
+            </a:r>
+            <a:r>
+              <a:rPr lang="en-US" altLang="en-US" sz="1200" dirty="0" smtClean="0">
+                <a:latin typeface="Courier New" pitchFamily="49" charset="0"/>
+                <a:cs typeface="Courier New" pitchFamily="49" charset="0"/>
+              </a:rPr>
+              <a:t>).</a:t>
+            </a:r>
+            <a:r>
+              <a:rPr lang="en-US" altLang="en-US" sz="1200" dirty="0">
+                <a:latin typeface="Courier New" pitchFamily="49" charset="0"/>
+                <a:cs typeface="Courier New" pitchFamily="49" charset="0"/>
+              </a:rPr>
+              <a:t>collect(</a:t>
             </a:r>
             <a:r>
               <a:rPr lang="en-US" altLang="en-US" sz="1200" dirty="0" err="1">
@@ -37081,35 +37113,35 @@
               </a:buClr>
             </a:pPr>
             <a:r>
-              <a:rPr lang="en-US" altLang="en-US" sz="1200" dirty="0">
+              <a:rPr lang="en-US" altLang="en-US" sz="1200" dirty="0" smtClean="0">
                 <a:latin typeface="Courier New" pitchFamily="49" charset="0"/>
                 <a:cs typeface="Courier New" pitchFamily="49" charset="0"/>
               </a:rPr>
               <a:t>Long result = </a:t>
             </a:r>
             <a:r>
-              <a:rPr lang="en-US" altLang="en-US" sz="1200" dirty="0" err="1">
+              <a:rPr lang="en-US" altLang="en-US" sz="1200" dirty="0" err="1" smtClean="0">
                 <a:latin typeface="Courier New" pitchFamily="49" charset="0"/>
                 <a:cs typeface="Courier New" pitchFamily="49" charset="0"/>
               </a:rPr>
               <a:t>persons.stream</a:t>
             </a:r>
             <a:r>
-              <a:rPr lang="en-US" altLang="en-US" sz="1200" dirty="0">
+              <a:rPr lang="en-US" altLang="en-US" sz="1200" dirty="0" smtClean="0">
                 <a:latin typeface="Courier New" pitchFamily="49" charset="0"/>
                 <a:cs typeface="Courier New" pitchFamily="49" charset="0"/>
               </a:rPr>
               <a:t>().collect(</a:t>
             </a:r>
             <a:r>
-              <a:rPr lang="en-US" altLang="en-US" sz="1200" dirty="0" err="1">
+              <a:rPr lang="en-US" altLang="en-US" sz="1200" dirty="0" err="1" smtClean="0">
                 <a:latin typeface="Courier New" pitchFamily="49" charset="0"/>
                 <a:cs typeface="Courier New" pitchFamily="49" charset="0"/>
               </a:rPr>
               <a:t>Collectors.counting</a:t>
             </a:r>
             <a:r>
-              <a:rPr lang="en-US" altLang="en-US" sz="1200" dirty="0">
+              <a:rPr lang="en-US" altLang="en-US" sz="1200" dirty="0" smtClean="0">
                 <a:latin typeface="Courier New" pitchFamily="49" charset="0"/>
                 <a:cs typeface="Courier New" pitchFamily="49" charset="0"/>
               </a:rPr>
@@ -37132,19 +37164,23 @@
               </a:buClr>
             </a:pPr>
             <a:r>
-              <a:rPr lang="en-US" altLang="en-US" sz="1200" dirty="0" err="1">
+              <a:rPr lang="en-US" altLang="en-US" sz="1200" dirty="0" err="1" smtClean="0">
                 <a:latin typeface="Courier New" pitchFamily="49" charset="0"/>
                 <a:cs typeface="Courier New" pitchFamily="49" charset="0"/>
               </a:rPr>
               <a:t>System.out.println</a:t>
             </a:r>
             <a:r>
-              <a:rPr lang="en-US" altLang="en-US" sz="1200" dirty="0">
+              <a:rPr lang="en-US" altLang="en-US" sz="1200" dirty="0" smtClean="0">
                 <a:latin typeface="Courier New" pitchFamily="49" charset="0"/>
                 <a:cs typeface="Courier New" pitchFamily="49" charset="0"/>
               </a:rPr>
               <a:t>(result);    // 4</a:t>
             </a:r>
+            <a:endParaRPr lang="en-US" altLang="en-US" sz="1200" dirty="0">
+              <a:latin typeface="Courier New" pitchFamily="49" charset="0"/>
+              <a:cs typeface="Courier New" pitchFamily="49" charset="0"/>
+            </a:endParaRPr>
           </a:p>
         </p:txBody>
       </p:sp>
@@ -37216,11 +37252,39 @@
               <a:t>persons.stream</a:t>
             </a:r>
             <a:r>
-              <a:rPr lang="en-US" altLang="en-US" sz="1200" dirty="0">
-                <a:latin typeface="Courier New" pitchFamily="49" charset="0"/>
-                <a:cs typeface="Courier New" pitchFamily="49" charset="0"/>
-              </a:rPr>
-              <a:t>().collect(</a:t>
+              <a:rPr lang="en-US" altLang="en-US" sz="1200" dirty="0" smtClean="0">
+                <a:latin typeface="Courier New" pitchFamily="49" charset="0"/>
+                <a:cs typeface="Courier New" pitchFamily="49" charset="0"/>
+              </a:rPr>
+              <a:t>().</a:t>
+            </a:r>
+            <a:r>
+              <a:rPr lang="en-US" altLang="en-US" sz="1200" dirty="0" smtClean="0">
+                <a:latin typeface="Courier New" pitchFamily="49" charset="0"/>
+                <a:cs typeface="Courier New" pitchFamily="49" charset="0"/>
+              </a:rPr>
+              <a:t>map(Person::</a:t>
+            </a:r>
+            <a:r>
+              <a:rPr lang="en-US" altLang="en-US" sz="1200" dirty="0" err="1" smtClean="0">
+                <a:latin typeface="Courier New" pitchFamily="49" charset="0"/>
+                <a:cs typeface="Courier New" pitchFamily="49" charset="0"/>
+              </a:rPr>
+              <a:t>getName</a:t>
+            </a:r>
+            <a:r>
+              <a:rPr lang="en-US" altLang="en-US" sz="1200" dirty="0" smtClean="0">
+                <a:latin typeface="Courier New" pitchFamily="49" charset="0"/>
+                <a:cs typeface="Courier New" pitchFamily="49" charset="0"/>
+              </a:rPr>
+              <a:t>).</a:t>
+            </a:r>
+            <a:r>
+              <a:rPr lang="en-US" altLang="en-US" sz="1200" dirty="0">
+                <a:latin typeface="Courier New" pitchFamily="49" charset="0"/>
+                <a:cs typeface="Courier New" pitchFamily="49" charset="0"/>
+              </a:rPr>
+              <a:t>collect(</a:t>
             </a:r>
             <a:r>
               <a:rPr lang="en-US" altLang="en-US" sz="1200" dirty="0" err="1">
@@ -37348,11 +37412,39 @@
               <a:t>persons.stream</a:t>
             </a:r>
             <a:r>
-              <a:rPr lang="en-US" altLang="en-US" sz="1200" dirty="0">
-                <a:latin typeface="Courier New" pitchFamily="49" charset="0"/>
-                <a:cs typeface="Courier New" pitchFamily="49" charset="0"/>
-              </a:rPr>
-              <a:t>().collect(</a:t>
+              <a:rPr lang="en-US" altLang="en-US" sz="1200" dirty="0" smtClean="0">
+                <a:latin typeface="Courier New" pitchFamily="49" charset="0"/>
+                <a:cs typeface="Courier New" pitchFamily="49" charset="0"/>
+              </a:rPr>
+              <a:t>().</a:t>
+            </a:r>
+            <a:r>
+              <a:rPr lang="en-US" altLang="en-US" sz="1200" dirty="0" smtClean="0">
+                <a:latin typeface="Courier New" pitchFamily="49" charset="0"/>
+                <a:cs typeface="Courier New" pitchFamily="49" charset="0"/>
+              </a:rPr>
+              <a:t>map(Person::</a:t>
+            </a:r>
+            <a:r>
+              <a:rPr lang="en-US" altLang="en-US" sz="1200" dirty="0" err="1" smtClean="0">
+                <a:latin typeface="Courier New" pitchFamily="49" charset="0"/>
+                <a:cs typeface="Courier New" pitchFamily="49" charset="0"/>
+              </a:rPr>
+              <a:t>getName</a:t>
+            </a:r>
+            <a:r>
+              <a:rPr lang="en-US" altLang="en-US" sz="1200" dirty="0" smtClean="0">
+                <a:latin typeface="Courier New" pitchFamily="49" charset="0"/>
+                <a:cs typeface="Courier New" pitchFamily="49" charset="0"/>
+              </a:rPr>
+              <a:t>).</a:t>
+            </a:r>
+            <a:r>
+              <a:rPr lang="en-US" altLang="en-US" sz="1200" dirty="0">
+                <a:latin typeface="Courier New" pitchFamily="49" charset="0"/>
+                <a:cs typeface="Courier New" pitchFamily="49" charset="0"/>
+              </a:rPr>
+              <a:t>collect(</a:t>
             </a:r>
             <a:r>
               <a:rPr lang="en-US" altLang="en-US" sz="1200" dirty="0" err="1">
@@ -38343,7 +38435,7 @@
           <p:cNvPr id="6" name="Rectangle 1">
             <a:extLst>
               <a:ext uri="{FF2B5EF4-FFF2-40B4-BE49-F238E27FC236}">
-                <a16:creationId xmlns="" xmlns:a16="http://schemas.microsoft.com/office/drawing/2014/main" id="{35AE0F07-F4C2-4332-AE1A-97E68AEEDA8B}"/>
+                <a16:creationId xmlns:a16="http://schemas.microsoft.com/office/drawing/2014/main" xmlns="" id="{35AE0F07-F4C2-4332-AE1A-97E68AEEDA8B}"/>
               </a:ext>
             </a:extLst>
           </p:cNvPr>
@@ -38509,7 +38601,7 @@
           <p:cNvPr id="3" name="Content Placeholder 2">
             <a:extLst>
               <a:ext uri="{FF2B5EF4-FFF2-40B4-BE49-F238E27FC236}">
-                <a16:creationId xmlns="" xmlns:a16="http://schemas.microsoft.com/office/drawing/2014/main" id="{F05B82B4-53B9-4CE8-A28D-BCD219F35834}"/>
+                <a16:creationId xmlns:a16="http://schemas.microsoft.com/office/drawing/2014/main" xmlns="" id="{F05B82B4-53B9-4CE8-A28D-BCD219F35834}"/>
               </a:ext>
             </a:extLst>
           </p:cNvPr>
@@ -38589,7 +38681,7 @@
           <p:cNvPr id="4" name="Title 1">
             <a:extLst>
               <a:ext uri="{FF2B5EF4-FFF2-40B4-BE49-F238E27FC236}">
-                <a16:creationId xmlns="" xmlns:a16="http://schemas.microsoft.com/office/drawing/2014/main" id="{C9CCD0EC-06E8-4EDE-970F-EE78F59EADEF}"/>
+                <a16:creationId xmlns:a16="http://schemas.microsoft.com/office/drawing/2014/main" xmlns="" id="{C9CCD0EC-06E8-4EDE-970F-EE78F59EADEF}"/>
               </a:ext>
             </a:extLst>
           </p:cNvPr>
@@ -38625,7 +38717,7 @@
           <p:cNvPr id="5" name="Star: 5 Points 4">
             <a:extLst>
               <a:ext uri="{FF2B5EF4-FFF2-40B4-BE49-F238E27FC236}">
-                <a16:creationId xmlns="" xmlns:a16="http://schemas.microsoft.com/office/drawing/2014/main" id="{A6766834-B70E-419D-9340-19E774E761A7}"/>
+                <a16:creationId xmlns:a16="http://schemas.microsoft.com/office/drawing/2014/main" xmlns="" id="{A6766834-B70E-419D-9340-19E774E761A7}"/>
               </a:ext>
             </a:extLst>
           </p:cNvPr>
@@ -38671,7 +38763,7 @@
           <p:cNvPr id="6" name="Star: 5 Points 5">
             <a:extLst>
               <a:ext uri="{FF2B5EF4-FFF2-40B4-BE49-F238E27FC236}">
-                <a16:creationId xmlns="" xmlns:a16="http://schemas.microsoft.com/office/drawing/2014/main" id="{1E2F0B84-4379-4DA9-9623-1ADB24F22811}"/>
+                <a16:creationId xmlns:a16="http://schemas.microsoft.com/office/drawing/2014/main" xmlns="" id="{1E2F0B84-4379-4DA9-9623-1ADB24F22811}"/>
               </a:ext>
             </a:extLst>
           </p:cNvPr>
@@ -38715,7 +38807,7 @@
     </p:spTree>
     <p:extLst>
       <p:ext uri="{BB962C8B-B14F-4D97-AF65-F5344CB8AC3E}">
-        <p14:creationId xmlns="" xmlns:p14="http://schemas.microsoft.com/office/powerpoint/2010/main" val="1988558727"/>
+        <p14:creationId xmlns:p14="http://schemas.microsoft.com/office/powerpoint/2010/main" xmlns="" val="1988558727"/>
       </p:ext>
     </p:extLst>
   </p:cSld>
@@ -38759,14 +38851,14 @@
           </a:xfrm>
           <a:extLst>
             <a:ext uri="{909E8E84-426E-40DD-AFC4-6F175D3DCCD1}">
-              <a14:hiddenFill xmlns="" xmlns:a14="http://schemas.microsoft.com/office/drawing/2010/main">
+              <a14:hiddenFill xmlns:a14="http://schemas.microsoft.com/office/drawing/2010/main" xmlns="">
                 <a:solidFill>
                   <a:schemeClr val="accent1"/>
                 </a:solidFill>
               </a14:hiddenFill>
             </a:ext>
             <a:ext uri="{91240B29-F687-4F45-9708-019B960494DF}">
-              <a14:hiddenLine xmlns="" xmlns:a14="http://schemas.microsoft.com/office/drawing/2010/main" w="9525">
+              <a14:hiddenLine xmlns:a14="http://schemas.microsoft.com/office/drawing/2010/main" xmlns="" w="9525">
                 <a:solidFill>
                   <a:schemeClr val="tx1"/>
                 </a:solidFill>
@@ -38776,7 +38868,7 @@
               </a14:hiddenLine>
             </a:ext>
             <a:ext uri="{AF507438-7753-43E0-B8FC-AC1667EBCBE1}">
-              <a14:hiddenEffects xmlns="" xmlns:a14="http://schemas.microsoft.com/office/drawing/2010/main">
+              <a14:hiddenEffects xmlns:a14="http://schemas.microsoft.com/office/drawing/2010/main" xmlns="">
                 <a:effectLst>
                   <a:outerShdw dist="35921" dir="2700000" algn="ctr" rotWithShape="0">
                     <a:schemeClr val="bg2"/>
@@ -38816,14 +38908,14 @@
           </a:xfrm>
           <a:extLst>
             <a:ext uri="{909E8E84-426E-40DD-AFC4-6F175D3DCCD1}">
-              <a14:hiddenFill xmlns="" xmlns:a14="http://schemas.microsoft.com/office/drawing/2010/main">
+              <a14:hiddenFill xmlns:a14="http://schemas.microsoft.com/office/drawing/2010/main" xmlns="">
                 <a:solidFill>
                   <a:schemeClr val="accent1"/>
                 </a:solidFill>
               </a14:hiddenFill>
             </a:ext>
             <a:ext uri="{91240B29-F687-4F45-9708-019B960494DF}">
-              <a14:hiddenLine xmlns="" xmlns:a14="http://schemas.microsoft.com/office/drawing/2010/main" w="9525">
+              <a14:hiddenLine xmlns:a14="http://schemas.microsoft.com/office/drawing/2010/main" xmlns="" w="9525">
                 <a:solidFill>
                   <a:schemeClr val="tx1"/>
                 </a:solidFill>
@@ -38833,7 +38925,7 @@
               </a14:hiddenLine>
             </a:ext>
             <a:ext uri="{AF507438-7753-43E0-B8FC-AC1667EBCBE1}">
-              <a14:hiddenEffects xmlns="" xmlns:a14="http://schemas.microsoft.com/office/drawing/2010/main">
+              <a14:hiddenEffects xmlns:a14="http://schemas.microsoft.com/office/drawing/2010/main" xmlns="">
                 <a:effectLst>
                   <a:outerShdw dist="35921" dir="2700000" algn="ctr" rotWithShape="0">
                     <a:schemeClr val="bg2"/>
@@ -38930,7 +39022,7 @@
           <p:cNvPr id="9" name="Rectangle 4">
             <a:extLst>
               <a:ext uri="{FF2B5EF4-FFF2-40B4-BE49-F238E27FC236}">
-                <a16:creationId xmlns="" xmlns:a16="http://schemas.microsoft.com/office/drawing/2014/main" id="{353910E6-4D73-4A07-94A7-E90E9A3A4F78}"/>
+                <a16:creationId xmlns:a16="http://schemas.microsoft.com/office/drawing/2014/main" xmlns="" id="{353910E6-4D73-4A07-94A7-E90E9A3A4F78}"/>
               </a:ext>
             </a:extLst>
           </p:cNvPr>
@@ -38962,7 +39054,7 @@
           <a:effectLst/>
           <a:extLst>
             <a:ext uri="{AF507438-7753-43E0-B8FC-AC1667EBCBE1}">
-              <a14:hiddenEffects xmlns="" xmlns:a14="http://schemas.microsoft.com/office/drawing/2010/main">
+              <a14:hiddenEffects xmlns:a14="http://schemas.microsoft.com/office/drawing/2010/main" xmlns="">
                 <a:effectLst>
                   <a:outerShdw dist="35921" dir="2700000" algn="ctr" rotWithShape="0">
                     <a:schemeClr val="bg2"/>
@@ -39004,7 +39096,7 @@
           <p:cNvPr id="4" name="Rectangle 1">
             <a:extLst>
               <a:ext uri="{FF2B5EF4-FFF2-40B4-BE49-F238E27FC236}">
-                <a16:creationId xmlns="" xmlns:a16="http://schemas.microsoft.com/office/drawing/2014/main" id="{54D91266-8F6B-486F-A31A-4B1217D8A1D8}"/>
+                <a16:creationId xmlns:a16="http://schemas.microsoft.com/office/drawing/2014/main" xmlns="" id="{54D91266-8F6B-486F-A31A-4B1217D8A1D8}"/>
               </a:ext>
             </a:extLst>
           </p:cNvPr>
@@ -39036,7 +39128,7 @@
           <a:effectLst/>
           <a:extLst>
             <a:ext uri="{AF507438-7753-43E0-B8FC-AC1667EBCBE1}">
-              <a14:hiddenEffects xmlns="" xmlns:a14="http://schemas.microsoft.com/office/drawing/2010/main">
+              <a14:hiddenEffects xmlns:a14="http://schemas.microsoft.com/office/drawing/2010/main" xmlns="">
                 <a:effectLst>
                   <a:outerShdw dist="35921" dir="2700000" algn="ctr" rotWithShape="0">
                     <a:schemeClr val="bg2"/>
@@ -39541,7 +39633,7 @@
     </p:spTree>
     <p:extLst>
       <p:ext uri="{BB962C8B-B14F-4D97-AF65-F5344CB8AC3E}">
-        <p14:creationId xmlns="" xmlns:p14="http://schemas.microsoft.com/office/powerpoint/2010/main" val="3145967748"/>
+        <p14:creationId xmlns:p14="http://schemas.microsoft.com/office/powerpoint/2010/main" xmlns="" val="3145967748"/>
       </p:ext>
     </p:extLst>
   </p:cSld>
@@ -40369,7 +40461,7 @@
           <p:cNvPr id="6" name="Rectangle 1">
             <a:extLst>
               <a:ext uri="{FF2B5EF4-FFF2-40B4-BE49-F238E27FC236}">
-                <a16:creationId xmlns="" xmlns:a16="http://schemas.microsoft.com/office/drawing/2014/main" id="{76648C3C-D35E-4982-A219-E7BC6211E596}"/>
+                <a16:creationId xmlns:a16="http://schemas.microsoft.com/office/drawing/2014/main" xmlns="" id="{76648C3C-D35E-4982-A219-E7BC6211E596}"/>
               </a:ext>
             </a:extLst>
           </p:cNvPr>
@@ -40401,7 +40493,7 @@
           <a:effectLst/>
           <a:extLst>
             <a:ext uri="{AF507438-7753-43E0-B8FC-AC1667EBCBE1}">
-              <a14:hiddenEffects xmlns="" xmlns:a14="http://schemas.microsoft.com/office/drawing/2010/main">
+              <a14:hiddenEffects xmlns:a14="http://schemas.microsoft.com/office/drawing/2010/main" xmlns="">
                 <a:effectLst>
                   <a:outerShdw dist="35921" dir="2700000" algn="ctr" rotWithShape="0">
                     <a:schemeClr val="bg2"/>
@@ -40471,7 +40563,7 @@
           <p:cNvPr id="5" name="Rectangle 1">
             <a:extLst>
               <a:ext uri="{FF2B5EF4-FFF2-40B4-BE49-F238E27FC236}">
-                <a16:creationId xmlns="" xmlns:a16="http://schemas.microsoft.com/office/drawing/2014/main" id="{5083A840-71A9-45A2-9B2B-1A9E6AD4BFBA}"/>
+                <a16:creationId xmlns:a16="http://schemas.microsoft.com/office/drawing/2014/main" xmlns="" id="{5083A840-71A9-45A2-9B2B-1A9E6AD4BFBA}"/>
               </a:ext>
             </a:extLst>
           </p:cNvPr>
@@ -40503,7 +40595,7 @@
           <a:effectLst/>
           <a:extLst>
             <a:ext uri="{AF507438-7753-43E0-B8FC-AC1667EBCBE1}">
-              <a14:hiddenEffects xmlns="" xmlns:a14="http://schemas.microsoft.com/office/drawing/2010/main">
+              <a14:hiddenEffects xmlns:a14="http://schemas.microsoft.com/office/drawing/2010/main" xmlns="">
                 <a:effectLst>
                   <a:outerShdw dist="35921" dir="2700000" algn="ctr" rotWithShape="0">
                     <a:schemeClr val="bg2"/>
@@ -40597,7 +40689,7 @@
     </p:spTree>
     <p:extLst>
       <p:ext uri="{BB962C8B-B14F-4D97-AF65-F5344CB8AC3E}">
-        <p14:creationId xmlns="" xmlns:p14="http://schemas.microsoft.com/office/powerpoint/2010/main" val="2765597155"/>
+        <p14:creationId xmlns:p14="http://schemas.microsoft.com/office/powerpoint/2010/main" xmlns="" val="2765597155"/>
       </p:ext>
     </p:extLst>
   </p:cSld>
@@ -40797,7 +40889,7 @@
           <a:effectLst/>
           <a:extLst>
             <a:ext uri="{AF507438-7753-43E0-B8FC-AC1667EBCBE1}">
-              <a14:hiddenEffects xmlns="" xmlns:a14="http://schemas.microsoft.com/office/drawing/2010/main">
+              <a14:hiddenEffects xmlns:a14="http://schemas.microsoft.com/office/drawing/2010/main" xmlns="">
                 <a:effectLst>
                   <a:outerShdw dist="35921" dir="2700000" algn="ctr" rotWithShape="0">
                     <a:schemeClr val="bg2"/>
@@ -40924,7 +41016,7 @@
     </p:spTree>
     <p:extLst>
       <p:ext uri="{BB962C8B-B14F-4D97-AF65-F5344CB8AC3E}">
-        <p14:creationId xmlns="" xmlns:p14="http://schemas.microsoft.com/office/powerpoint/2010/main" val="1327424260"/>
+        <p14:creationId xmlns:p14="http://schemas.microsoft.com/office/powerpoint/2010/main" xmlns="" val="1327424260"/>
       </p:ext>
     </p:extLst>
   </p:cSld>
@@ -41005,7 +41097,7 @@
           </a:xfrm>
           <a:extLst>
             <a:ext uri="{AF507438-7753-43E0-B8FC-AC1667EBCBE1}">
-              <a14:hiddenEffects xmlns="" xmlns:a14="http://schemas.microsoft.com/office/drawing/2010/main">
+              <a14:hiddenEffects xmlns:a14="http://schemas.microsoft.com/office/drawing/2010/main" xmlns="">
                 <a:effectLst>
                   <a:outerShdw dist="35921" dir="2700000" algn="ctr" rotWithShape="0">
                     <a:schemeClr val="bg2"/>
@@ -41201,7 +41293,7 @@
           <a:effectLst/>
           <a:extLst>
             <a:ext uri="{AF507438-7753-43E0-B8FC-AC1667EBCBE1}">
-              <a14:hiddenEffects xmlns="" xmlns:a14="http://schemas.microsoft.com/office/drawing/2010/main">
+              <a14:hiddenEffects xmlns:a14="http://schemas.microsoft.com/office/drawing/2010/main" xmlns="">
                 <a:effectLst>
                   <a:outerShdw dist="35921" dir="2700000" algn="ctr" rotWithShape="0">
                     <a:schemeClr val="bg2"/>
@@ -41364,7 +41456,7 @@
           <p:cNvPr id="6" name="Rectangle 2">
             <a:extLst>
               <a:ext uri="{FF2B5EF4-FFF2-40B4-BE49-F238E27FC236}">
-                <a16:creationId xmlns="" xmlns:a16="http://schemas.microsoft.com/office/drawing/2014/main" id="{4E7EE6AE-BAD3-40E6-84AA-C23A03B2D81F}"/>
+                <a16:creationId xmlns:a16="http://schemas.microsoft.com/office/drawing/2014/main" xmlns="" id="{4E7EE6AE-BAD3-40E6-84AA-C23A03B2D81F}"/>
               </a:ext>
             </a:extLst>
           </p:cNvPr>
@@ -41396,7 +41488,7 @@
           <a:effectLst/>
           <a:extLst>
             <a:ext uri="{AF507438-7753-43E0-B8FC-AC1667EBCBE1}">
-              <a14:hiddenEffects xmlns="" xmlns:a14="http://schemas.microsoft.com/office/drawing/2010/main">
+              <a14:hiddenEffects xmlns:a14="http://schemas.microsoft.com/office/drawing/2010/main" xmlns="">
                 <a:effectLst>
                   <a:outerShdw dist="35921" dir="2700000" algn="ctr" rotWithShape="0">
                     <a:schemeClr val="bg2"/>
@@ -41578,7 +41670,7 @@
     </p:spTree>
     <p:extLst>
       <p:ext uri="{BB962C8B-B14F-4D97-AF65-F5344CB8AC3E}">
-        <p14:creationId xmlns="" xmlns:p14="http://schemas.microsoft.com/office/powerpoint/2010/main" val="1327424260"/>
+        <p14:creationId xmlns:p14="http://schemas.microsoft.com/office/powerpoint/2010/main" xmlns="" val="1327424260"/>
       </p:ext>
     </p:extLst>
   </p:cSld>
@@ -41806,7 +41898,7 @@
           <p:cNvPr id="4" name="Rectangle 1">
             <a:extLst>
               <a:ext uri="{FF2B5EF4-FFF2-40B4-BE49-F238E27FC236}">
-                <a16:creationId xmlns="" xmlns:a16="http://schemas.microsoft.com/office/drawing/2014/main" id="{DD287304-A33A-477C-99D7-35322994A89E}"/>
+                <a16:creationId xmlns:a16="http://schemas.microsoft.com/office/drawing/2014/main" xmlns="" id="{DD287304-A33A-477C-99D7-35322994A89E}"/>
               </a:ext>
             </a:extLst>
           </p:cNvPr>
@@ -41838,7 +41930,7 @@
           <a:effectLst/>
           <a:extLst>
             <a:ext uri="{AF507438-7753-43E0-B8FC-AC1667EBCBE1}">
-              <a14:hiddenEffects xmlns="" xmlns:a14="http://schemas.microsoft.com/office/drawing/2010/main">
+              <a14:hiddenEffects xmlns:a14="http://schemas.microsoft.com/office/drawing/2010/main" xmlns="">
                 <a:effectLst>
                   <a:outerShdw dist="35921" dir="2700000" algn="ctr" rotWithShape="0">
                     <a:schemeClr val="bg2"/>
@@ -42149,7 +42241,7 @@
     </p:spTree>
     <p:extLst>
       <p:ext uri="{BB962C8B-B14F-4D97-AF65-F5344CB8AC3E}">
-        <p14:creationId xmlns="" xmlns:p14="http://schemas.microsoft.com/office/powerpoint/2010/main" val="1327424260"/>
+        <p14:creationId xmlns:p14="http://schemas.microsoft.com/office/powerpoint/2010/main" xmlns="" val="1327424260"/>
       </p:ext>
     </p:extLst>
   </p:cSld>
@@ -42413,7 +42505,7 @@
   <a:extraClrSchemeLst/>
   <a:extLst>
     <a:ext uri="{05A4C25C-085E-4340-85A3-A5531E510DB2}">
-      <thm15:themeFamily xmlns="" xmlns:thm15="http://schemas.microsoft.com/office/thememl/2012/main" name="Badge" id="{71A07785-5930-41D4-9A83-E23602B48E98}" vid="{A1A3E1F0-B5EF-49C5-810A-B1B32AEDDC80}"/>
+      <thm15:themeFamily xmlns:thm15="http://schemas.microsoft.com/office/thememl/2012/main" xmlns="" name="Badge" id="{71A07785-5930-41D4-9A83-E23602B48E98}" vid="{A1A3E1F0-B5EF-49C5-810A-B1B32AEDDC80}"/>
     </a:ext>
   </a:extLst>
 </a:theme>

</xml_diff>